<commit_message>
Update Team Project Presentation.pptx
</commit_message>
<xml_diff>
--- a/Team Project Presentation/Team Project Presentation.pptx
+++ b/Team Project Presentation/Team Project Presentation.pptx
@@ -4,9 +4,12 @@
   <p:sldMasterIdLst>
     <p:sldMasterId id="2147483648" r:id="rId1"/>
   </p:sldMasterIdLst>
+  <p:notesMasterIdLst>
+    <p:notesMasterId r:id="rId5"/>
+  </p:notesMasterIdLst>
   <p:sldIdLst>
-    <p:sldId id="256" r:id="rId2"/>
-    <p:sldId id="257" r:id="rId3"/>
+    <p:sldId id="257" r:id="rId2"/>
+    <p:sldId id="256" r:id="rId3"/>
     <p:sldId id="258" r:id="rId4"/>
   </p:sldIdLst>
   <p:sldSz cx="12192000" cy="6858000"/>
@@ -114,6 +117,440 @@
 </p:presentation>
 </file>
 
+<file path=ppt/notesMasters/notesMaster1.xml><?xml version="1.0" encoding="utf-8"?>
+<p:notesMaster xmlns:a="http://schemas.openxmlformats.org/drawingml/2006/main" xmlns:r="http://schemas.openxmlformats.org/officeDocument/2006/relationships" xmlns:p="http://schemas.openxmlformats.org/presentationml/2006/main">
+  <p:cSld>
+    <p:bg>
+      <p:bgRef idx="1001">
+        <a:schemeClr val="bg1"/>
+      </p:bgRef>
+    </p:bg>
+    <p:spTree>
+      <p:nvGrpSpPr>
+        <p:cNvPr id="1" name=""/>
+        <p:cNvGrpSpPr/>
+        <p:nvPr/>
+      </p:nvGrpSpPr>
+      <p:grpSpPr>
+        <a:xfrm>
+          <a:off x="0" y="0"/>
+          <a:ext cx="0" cy="0"/>
+          <a:chOff x="0" y="0"/>
+          <a:chExt cx="0" cy="0"/>
+        </a:xfrm>
+      </p:grpSpPr>
+      <p:sp>
+        <p:nvSpPr>
+          <p:cNvPr id="2" name="Header Placeholder 1"/>
+          <p:cNvSpPr>
+            <a:spLocks noGrp="1"/>
+          </p:cNvSpPr>
+          <p:nvPr>
+            <p:ph type="hdr" sz="quarter"/>
+          </p:nvPr>
+        </p:nvSpPr>
+        <p:spPr>
+          <a:xfrm>
+            <a:off x="0" y="0"/>
+            <a:ext cx="2971800" cy="458788"/>
+          </a:xfrm>
+          <a:prstGeom prst="rect">
+            <a:avLst/>
+          </a:prstGeom>
+        </p:spPr>
+        <p:txBody>
+          <a:bodyPr vert="horz" lIns="91440" tIns="45720" rIns="91440" bIns="45720" rtlCol="0"/>
+          <a:lstStyle>
+            <a:lvl1pPr algn="l">
+              <a:defRPr sz="1200"/>
+            </a:lvl1pPr>
+          </a:lstStyle>
+          <a:p>
+            <a:endParaRPr lang="en-NZ"/>
+          </a:p>
+        </p:txBody>
+      </p:sp>
+      <p:sp>
+        <p:nvSpPr>
+          <p:cNvPr id="3" name="Date Placeholder 2"/>
+          <p:cNvSpPr>
+            <a:spLocks noGrp="1"/>
+          </p:cNvSpPr>
+          <p:nvPr>
+            <p:ph type="dt" idx="1"/>
+          </p:nvPr>
+        </p:nvSpPr>
+        <p:spPr>
+          <a:xfrm>
+            <a:off x="3884613" y="0"/>
+            <a:ext cx="2971800" cy="458788"/>
+          </a:xfrm>
+          <a:prstGeom prst="rect">
+            <a:avLst/>
+          </a:prstGeom>
+        </p:spPr>
+        <p:txBody>
+          <a:bodyPr vert="horz" lIns="91440" tIns="45720" rIns="91440" bIns="45720" rtlCol="0"/>
+          <a:lstStyle>
+            <a:lvl1pPr algn="r">
+              <a:defRPr sz="1200"/>
+            </a:lvl1pPr>
+          </a:lstStyle>
+          <a:p>
+            <a:fld id="{DCA1B837-0204-4EC3-AEE9-32EEE315734B}" type="datetimeFigureOut">
+              <a:rPr lang="en-NZ" smtClean="0"/>
+              <a:t>21/05/2021</a:t>
+            </a:fld>
+            <a:endParaRPr lang="en-NZ"/>
+          </a:p>
+        </p:txBody>
+      </p:sp>
+      <p:sp>
+        <p:nvSpPr>
+          <p:cNvPr id="4" name="Slide Image Placeholder 3"/>
+          <p:cNvSpPr>
+            <a:spLocks noGrp="1" noRot="1" noChangeAspect="1"/>
+          </p:cNvSpPr>
+          <p:nvPr>
+            <p:ph type="sldImg" idx="2"/>
+          </p:nvPr>
+        </p:nvSpPr>
+        <p:spPr>
+          <a:xfrm>
+            <a:off x="685800" y="1143000"/>
+            <a:ext cx="5486400" cy="3086100"/>
+          </a:xfrm>
+          <a:prstGeom prst="rect">
+            <a:avLst/>
+          </a:prstGeom>
+          <a:noFill/>
+          <a:ln w="12700">
+            <a:solidFill>
+              <a:prstClr val="black"/>
+            </a:solidFill>
+          </a:ln>
+        </p:spPr>
+        <p:txBody>
+          <a:bodyPr vert="horz" lIns="91440" tIns="45720" rIns="91440" bIns="45720" rtlCol="0" anchor="ctr"/>
+          <a:lstStyle/>
+          <a:p>
+            <a:endParaRPr lang="en-NZ"/>
+          </a:p>
+        </p:txBody>
+      </p:sp>
+      <p:sp>
+        <p:nvSpPr>
+          <p:cNvPr id="5" name="Notes Placeholder 4"/>
+          <p:cNvSpPr>
+            <a:spLocks noGrp="1"/>
+          </p:cNvSpPr>
+          <p:nvPr>
+            <p:ph type="body" sz="quarter" idx="3"/>
+          </p:nvPr>
+        </p:nvSpPr>
+        <p:spPr>
+          <a:xfrm>
+            <a:off x="685800" y="4400550"/>
+            <a:ext cx="5486400" cy="3600450"/>
+          </a:xfrm>
+          <a:prstGeom prst="rect">
+            <a:avLst/>
+          </a:prstGeom>
+        </p:spPr>
+        <p:txBody>
+          <a:bodyPr vert="horz" lIns="91440" tIns="45720" rIns="91440" bIns="45720" rtlCol="0"/>
+          <a:lstStyle/>
+          <a:p>
+            <a:pPr lvl="0"/>
+            <a:r>
+              <a:rPr lang="en-US"/>
+              <a:t>Edit Master text styles</a:t>
+            </a:r>
+          </a:p>
+          <a:p>
+            <a:pPr lvl="1"/>
+            <a:r>
+              <a:rPr lang="en-US"/>
+              <a:t>Second level</a:t>
+            </a:r>
+          </a:p>
+          <a:p>
+            <a:pPr lvl="2"/>
+            <a:r>
+              <a:rPr lang="en-US"/>
+              <a:t>Third level</a:t>
+            </a:r>
+          </a:p>
+          <a:p>
+            <a:pPr lvl="3"/>
+            <a:r>
+              <a:rPr lang="en-US"/>
+              <a:t>Fourth level</a:t>
+            </a:r>
+          </a:p>
+          <a:p>
+            <a:pPr lvl="4"/>
+            <a:r>
+              <a:rPr lang="en-US"/>
+              <a:t>Fifth level</a:t>
+            </a:r>
+            <a:endParaRPr lang="en-NZ"/>
+          </a:p>
+        </p:txBody>
+      </p:sp>
+      <p:sp>
+        <p:nvSpPr>
+          <p:cNvPr id="6" name="Footer Placeholder 5"/>
+          <p:cNvSpPr>
+            <a:spLocks noGrp="1"/>
+          </p:cNvSpPr>
+          <p:nvPr>
+            <p:ph type="ftr" sz="quarter" idx="4"/>
+          </p:nvPr>
+        </p:nvSpPr>
+        <p:spPr>
+          <a:xfrm>
+            <a:off x="0" y="8685213"/>
+            <a:ext cx="2971800" cy="458787"/>
+          </a:xfrm>
+          <a:prstGeom prst="rect">
+            <a:avLst/>
+          </a:prstGeom>
+        </p:spPr>
+        <p:txBody>
+          <a:bodyPr vert="horz" lIns="91440" tIns="45720" rIns="91440" bIns="45720" rtlCol="0" anchor="b"/>
+          <a:lstStyle>
+            <a:lvl1pPr algn="l">
+              <a:defRPr sz="1200"/>
+            </a:lvl1pPr>
+          </a:lstStyle>
+          <a:p>
+            <a:endParaRPr lang="en-NZ"/>
+          </a:p>
+        </p:txBody>
+      </p:sp>
+      <p:sp>
+        <p:nvSpPr>
+          <p:cNvPr id="7" name="Slide Number Placeholder 6"/>
+          <p:cNvSpPr>
+            <a:spLocks noGrp="1"/>
+          </p:cNvSpPr>
+          <p:nvPr>
+            <p:ph type="sldNum" sz="quarter" idx="5"/>
+          </p:nvPr>
+        </p:nvSpPr>
+        <p:spPr>
+          <a:xfrm>
+            <a:off x="3884613" y="8685213"/>
+            <a:ext cx="2971800" cy="458787"/>
+          </a:xfrm>
+          <a:prstGeom prst="rect">
+            <a:avLst/>
+          </a:prstGeom>
+        </p:spPr>
+        <p:txBody>
+          <a:bodyPr vert="horz" lIns="91440" tIns="45720" rIns="91440" bIns="45720" rtlCol="0" anchor="b"/>
+          <a:lstStyle>
+            <a:lvl1pPr algn="r">
+              <a:defRPr sz="1200"/>
+            </a:lvl1pPr>
+          </a:lstStyle>
+          <a:p>
+            <a:fld id="{901B5FD9-F543-4A55-B35D-EB9BA7480B39}" type="slidenum">
+              <a:rPr lang="en-NZ" smtClean="0"/>
+              <a:t>‹#›</a:t>
+            </a:fld>
+            <a:endParaRPr lang="en-NZ"/>
+          </a:p>
+        </p:txBody>
+      </p:sp>
+    </p:spTree>
+    <p:extLst>
+      <p:ext uri="{BB962C8B-B14F-4D97-AF65-F5344CB8AC3E}">
+        <p14:creationId xmlns:p14="http://schemas.microsoft.com/office/powerpoint/2010/main" val="830162321"/>
+      </p:ext>
+    </p:extLst>
+  </p:cSld>
+  <p:clrMap bg1="lt1" tx1="dk1" bg2="lt2" tx2="dk2" accent1="accent1" accent2="accent2" accent3="accent3" accent4="accent4" accent5="accent5" accent6="accent6" hlink="hlink" folHlink="folHlink"/>
+  <p:notesStyle>
+    <a:lvl1pPr marL="0" algn="l" defTabSz="914400" rtl="0" eaLnBrk="1" latinLnBrk="0" hangingPunct="1">
+      <a:defRPr sz="1200" kern="1200">
+        <a:solidFill>
+          <a:schemeClr val="tx1"/>
+        </a:solidFill>
+        <a:latin typeface="+mn-lt"/>
+        <a:ea typeface="+mn-ea"/>
+        <a:cs typeface="+mn-cs"/>
+      </a:defRPr>
+    </a:lvl1pPr>
+    <a:lvl2pPr marL="457200" algn="l" defTabSz="914400" rtl="0" eaLnBrk="1" latinLnBrk="0" hangingPunct="1">
+      <a:defRPr sz="1200" kern="1200">
+        <a:solidFill>
+          <a:schemeClr val="tx1"/>
+        </a:solidFill>
+        <a:latin typeface="+mn-lt"/>
+        <a:ea typeface="+mn-ea"/>
+        <a:cs typeface="+mn-cs"/>
+      </a:defRPr>
+    </a:lvl2pPr>
+    <a:lvl3pPr marL="914400" algn="l" defTabSz="914400" rtl="0" eaLnBrk="1" latinLnBrk="0" hangingPunct="1">
+      <a:defRPr sz="1200" kern="1200">
+        <a:solidFill>
+          <a:schemeClr val="tx1"/>
+        </a:solidFill>
+        <a:latin typeface="+mn-lt"/>
+        <a:ea typeface="+mn-ea"/>
+        <a:cs typeface="+mn-cs"/>
+      </a:defRPr>
+    </a:lvl3pPr>
+    <a:lvl4pPr marL="1371600" algn="l" defTabSz="914400" rtl="0" eaLnBrk="1" latinLnBrk="0" hangingPunct="1">
+      <a:defRPr sz="1200" kern="1200">
+        <a:solidFill>
+          <a:schemeClr val="tx1"/>
+        </a:solidFill>
+        <a:latin typeface="+mn-lt"/>
+        <a:ea typeface="+mn-ea"/>
+        <a:cs typeface="+mn-cs"/>
+      </a:defRPr>
+    </a:lvl4pPr>
+    <a:lvl5pPr marL="1828800" algn="l" defTabSz="914400" rtl="0" eaLnBrk="1" latinLnBrk="0" hangingPunct="1">
+      <a:defRPr sz="1200" kern="1200">
+        <a:solidFill>
+          <a:schemeClr val="tx1"/>
+        </a:solidFill>
+        <a:latin typeface="+mn-lt"/>
+        <a:ea typeface="+mn-ea"/>
+        <a:cs typeface="+mn-cs"/>
+      </a:defRPr>
+    </a:lvl5pPr>
+    <a:lvl6pPr marL="2286000" algn="l" defTabSz="914400" rtl="0" eaLnBrk="1" latinLnBrk="0" hangingPunct="1">
+      <a:defRPr sz="1200" kern="1200">
+        <a:solidFill>
+          <a:schemeClr val="tx1"/>
+        </a:solidFill>
+        <a:latin typeface="+mn-lt"/>
+        <a:ea typeface="+mn-ea"/>
+        <a:cs typeface="+mn-cs"/>
+      </a:defRPr>
+    </a:lvl6pPr>
+    <a:lvl7pPr marL="2743200" algn="l" defTabSz="914400" rtl="0" eaLnBrk="1" latinLnBrk="0" hangingPunct="1">
+      <a:defRPr sz="1200" kern="1200">
+        <a:solidFill>
+          <a:schemeClr val="tx1"/>
+        </a:solidFill>
+        <a:latin typeface="+mn-lt"/>
+        <a:ea typeface="+mn-ea"/>
+        <a:cs typeface="+mn-cs"/>
+      </a:defRPr>
+    </a:lvl7pPr>
+    <a:lvl8pPr marL="3200400" algn="l" defTabSz="914400" rtl="0" eaLnBrk="1" latinLnBrk="0" hangingPunct="1">
+      <a:defRPr sz="1200" kern="1200">
+        <a:solidFill>
+          <a:schemeClr val="tx1"/>
+        </a:solidFill>
+        <a:latin typeface="+mn-lt"/>
+        <a:ea typeface="+mn-ea"/>
+        <a:cs typeface="+mn-cs"/>
+      </a:defRPr>
+    </a:lvl8pPr>
+    <a:lvl9pPr marL="3657600" algn="l" defTabSz="914400" rtl="0" eaLnBrk="1" latinLnBrk="0" hangingPunct="1">
+      <a:defRPr sz="1200" kern="1200">
+        <a:solidFill>
+          <a:schemeClr val="tx1"/>
+        </a:solidFill>
+        <a:latin typeface="+mn-lt"/>
+        <a:ea typeface="+mn-ea"/>
+        <a:cs typeface="+mn-cs"/>
+      </a:defRPr>
+    </a:lvl9pPr>
+  </p:notesStyle>
+</p:notesMaster>
+</file>
+
+<file path=ppt/notesSlides/notesSlide1.xml><?xml version="1.0" encoding="utf-8"?>
+<p:notes xmlns:a="http://schemas.openxmlformats.org/drawingml/2006/main" xmlns:r="http://schemas.openxmlformats.org/officeDocument/2006/relationships" xmlns:p="http://schemas.openxmlformats.org/presentationml/2006/main">
+  <p:cSld>
+    <p:spTree>
+      <p:nvGrpSpPr>
+        <p:cNvPr id="1" name=""/>
+        <p:cNvGrpSpPr/>
+        <p:nvPr/>
+      </p:nvGrpSpPr>
+      <p:grpSpPr>
+        <a:xfrm>
+          <a:off x="0" y="0"/>
+          <a:ext cx="0" cy="0"/>
+          <a:chOff x="0" y="0"/>
+          <a:chExt cx="0" cy="0"/>
+        </a:xfrm>
+      </p:grpSpPr>
+      <p:sp>
+        <p:nvSpPr>
+          <p:cNvPr id="2" name="Slide Image Placeholder 1"/>
+          <p:cNvSpPr>
+            <a:spLocks noGrp="1" noRot="1" noChangeAspect="1"/>
+          </p:cNvSpPr>
+          <p:nvPr>
+            <p:ph type="sldImg"/>
+          </p:nvPr>
+        </p:nvSpPr>
+        <p:spPr/>
+      </p:sp>
+      <p:sp>
+        <p:nvSpPr>
+          <p:cNvPr id="3" name="Notes Placeholder 2"/>
+          <p:cNvSpPr>
+            <a:spLocks noGrp="1"/>
+          </p:cNvSpPr>
+          <p:nvPr>
+            <p:ph type="body" idx="1"/>
+          </p:nvPr>
+        </p:nvSpPr>
+        <p:spPr/>
+        <p:txBody>
+          <a:bodyPr/>
+          <a:lstStyle/>
+          <a:p>
+            <a:endParaRPr lang="en-NZ" dirty="0"/>
+          </a:p>
+        </p:txBody>
+      </p:sp>
+      <p:sp>
+        <p:nvSpPr>
+          <p:cNvPr id="4" name="Slide Number Placeholder 3"/>
+          <p:cNvSpPr>
+            <a:spLocks noGrp="1"/>
+          </p:cNvSpPr>
+          <p:nvPr>
+            <p:ph type="sldNum" sz="quarter" idx="5"/>
+          </p:nvPr>
+        </p:nvSpPr>
+        <p:spPr/>
+        <p:txBody>
+          <a:bodyPr/>
+          <a:lstStyle/>
+          <a:p>
+            <a:fld id="{901B5FD9-F543-4A55-B35D-EB9BA7480B39}" type="slidenum">
+              <a:rPr lang="en-NZ" smtClean="0"/>
+              <a:t>2</a:t>
+            </a:fld>
+            <a:endParaRPr lang="en-NZ"/>
+          </a:p>
+        </p:txBody>
+      </p:sp>
+    </p:spTree>
+    <p:extLst>
+      <p:ext uri="{BB962C8B-B14F-4D97-AF65-F5344CB8AC3E}">
+        <p14:creationId xmlns:p14="http://schemas.microsoft.com/office/powerpoint/2010/main" val="3011918490"/>
+      </p:ext>
+    </p:extLst>
+  </p:cSld>
+  <p:clrMapOvr>
+    <a:masterClrMapping/>
+  </p:clrMapOvr>
+</p:notes>
+</file>
+
 <file path=ppt/slideLayouts/slideLayout1.xml><?xml version="1.0" encoding="utf-8"?>
 <p:sldLayout xmlns:a="http://schemas.openxmlformats.org/drawingml/2006/main" xmlns:r="http://schemas.openxmlformats.org/officeDocument/2006/relationships" xmlns:p="http://schemas.openxmlformats.org/presentationml/2006/main" type="title" preserve="1">
   <p:cSld name="Title Slide">
@@ -263,7 +700,7 @@
           <a:p>
             <a:fld id="{CAD5D408-A44C-47C5-95A4-5F732A94E53A}" type="datetimeFigureOut">
               <a:rPr lang="en-NZ" smtClean="0"/>
-              <a:t>20/05/2021</a:t>
+              <a:t>21/05/2021</a:t>
             </a:fld>
             <a:endParaRPr lang="en-NZ"/>
           </a:p>
@@ -463,7 +900,7 @@
           <a:p>
             <a:fld id="{CAD5D408-A44C-47C5-95A4-5F732A94E53A}" type="datetimeFigureOut">
               <a:rPr lang="en-NZ" smtClean="0"/>
-              <a:t>20/05/2021</a:t>
+              <a:t>21/05/2021</a:t>
             </a:fld>
             <a:endParaRPr lang="en-NZ"/>
           </a:p>
@@ -673,7 +1110,7 @@
           <a:p>
             <a:fld id="{CAD5D408-A44C-47C5-95A4-5F732A94E53A}" type="datetimeFigureOut">
               <a:rPr lang="en-NZ" smtClean="0"/>
-              <a:t>20/05/2021</a:t>
+              <a:t>21/05/2021</a:t>
             </a:fld>
             <a:endParaRPr lang="en-NZ"/>
           </a:p>
@@ -873,7 +1310,7 @@
           <a:p>
             <a:fld id="{CAD5D408-A44C-47C5-95A4-5F732A94E53A}" type="datetimeFigureOut">
               <a:rPr lang="en-NZ" smtClean="0"/>
-              <a:t>20/05/2021</a:t>
+              <a:t>21/05/2021</a:t>
             </a:fld>
             <a:endParaRPr lang="en-NZ"/>
           </a:p>
@@ -1149,7 +1586,7 @@
           <a:p>
             <a:fld id="{CAD5D408-A44C-47C5-95A4-5F732A94E53A}" type="datetimeFigureOut">
               <a:rPr lang="en-NZ" smtClean="0"/>
-              <a:t>20/05/2021</a:t>
+              <a:t>21/05/2021</a:t>
             </a:fld>
             <a:endParaRPr lang="en-NZ"/>
           </a:p>
@@ -1417,7 +1854,7 @@
           <a:p>
             <a:fld id="{CAD5D408-A44C-47C5-95A4-5F732A94E53A}" type="datetimeFigureOut">
               <a:rPr lang="en-NZ" smtClean="0"/>
-              <a:t>20/05/2021</a:t>
+              <a:t>21/05/2021</a:t>
             </a:fld>
             <a:endParaRPr lang="en-NZ"/>
           </a:p>
@@ -1832,7 +2269,7 @@
           <a:p>
             <a:fld id="{CAD5D408-A44C-47C5-95A4-5F732A94E53A}" type="datetimeFigureOut">
               <a:rPr lang="en-NZ" smtClean="0"/>
-              <a:t>20/05/2021</a:t>
+              <a:t>21/05/2021</a:t>
             </a:fld>
             <a:endParaRPr lang="en-NZ"/>
           </a:p>
@@ -1974,7 +2411,7 @@
           <a:p>
             <a:fld id="{CAD5D408-A44C-47C5-95A4-5F732A94E53A}" type="datetimeFigureOut">
               <a:rPr lang="en-NZ" smtClean="0"/>
-              <a:t>20/05/2021</a:t>
+              <a:t>21/05/2021</a:t>
             </a:fld>
             <a:endParaRPr lang="en-NZ"/>
           </a:p>
@@ -2087,7 +2524,7 @@
           <a:p>
             <a:fld id="{CAD5D408-A44C-47C5-95A4-5F732A94E53A}" type="datetimeFigureOut">
               <a:rPr lang="en-NZ" smtClean="0"/>
-              <a:t>20/05/2021</a:t>
+              <a:t>21/05/2021</a:t>
             </a:fld>
             <a:endParaRPr lang="en-NZ"/>
           </a:p>
@@ -2400,7 +2837,7 @@
           <a:p>
             <a:fld id="{CAD5D408-A44C-47C5-95A4-5F732A94E53A}" type="datetimeFigureOut">
               <a:rPr lang="en-NZ" smtClean="0"/>
-              <a:t>20/05/2021</a:t>
+              <a:t>21/05/2021</a:t>
             </a:fld>
             <a:endParaRPr lang="en-NZ"/>
           </a:p>
@@ -2689,7 +3126,7 @@
           <a:p>
             <a:fld id="{CAD5D408-A44C-47C5-95A4-5F732A94E53A}" type="datetimeFigureOut">
               <a:rPr lang="en-NZ" smtClean="0"/>
-              <a:t>20/05/2021</a:t>
+              <a:t>21/05/2021</a:t>
             </a:fld>
             <a:endParaRPr lang="en-NZ"/>
           </a:p>
@@ -2932,7 +3369,7 @@
           <a:p>
             <a:fld id="{CAD5D408-A44C-47C5-95A4-5F732A94E53A}" type="datetimeFigureOut">
               <a:rPr lang="en-NZ" smtClean="0"/>
-              <a:t>20/05/2021</a:t>
+              <a:t>21/05/2021</a:t>
             </a:fld>
             <a:endParaRPr lang="en-NZ"/>
           </a:p>
@@ -3351,10 +3788,10 @@
       </p:grpSpPr>
       <p:sp>
         <p:nvSpPr>
-          <p:cNvPr id="11" name="Rectangle 10">
-            <a:extLst>
-              <a:ext uri="{FF2B5EF4-FFF2-40B4-BE49-F238E27FC236}">
-                <a16:creationId xmlns:a16="http://schemas.microsoft.com/office/drawing/2014/main" id="{F73A7932-5662-460D-8B06-3EF6D2065E16}"/>
+          <p:cNvPr id="4" name="Rectangle 3">
+            <a:extLst>
+              <a:ext uri="{FF2B5EF4-FFF2-40B4-BE49-F238E27FC236}">
+                <a16:creationId xmlns:a16="http://schemas.microsoft.com/office/drawing/2014/main" id="{6A357B6E-43CB-47B6-A983-DCE7B7F1F1CA}"/>
               </a:ext>
             </a:extLst>
           </p:cNvPr>
@@ -3363,8 +3800,294 @@
         </p:nvSpPr>
         <p:spPr>
           <a:xfrm>
-            <a:off x="2201947" y="1775996"/>
-            <a:ext cx="317758" cy="2297864"/>
+            <a:off x="0" y="0"/>
+            <a:ext cx="4675704" cy="923330"/>
+          </a:xfrm>
+          <a:prstGeom prst="rect">
+            <a:avLst/>
+          </a:prstGeom>
+          <a:noFill/>
+        </p:spPr>
+        <p:txBody>
+          <a:bodyPr wrap="none" lIns="91440" tIns="45720" rIns="91440" bIns="45720">
+            <a:spAutoFit/>
+          </a:bodyPr>
+          <a:lstStyle/>
+          <a:p>
+            <a:pPr algn="ctr"/>
+            <a:r>
+              <a:rPr lang="en-US" sz="5400" dirty="0">
+                <a:ln w="0"/>
+                <a:solidFill>
+                  <a:srgbClr val="00B050"/>
+                </a:solidFill>
+                <a:effectLst>
+                  <a:outerShdw blurRad="38100" dist="38100" dir="2700000" algn="tl">
+                    <a:srgbClr val="00B050">
+                      <a:alpha val="43000"/>
+                    </a:srgbClr>
+                  </a:outerShdw>
+                </a:effectLst>
+                <a:latin typeface="Franklin Gothic Heavy" panose="020B0903020102020204" pitchFamily="34" charset="0"/>
+              </a:rPr>
+              <a:t>Opportunities</a:t>
+            </a:r>
+            <a:endParaRPr lang="en-US" sz="5400" b="0" cap="none" spc="0" dirty="0">
+              <a:ln w="0"/>
+              <a:solidFill>
+                <a:srgbClr val="00B050"/>
+              </a:solidFill>
+              <a:effectLst>
+                <a:outerShdw blurRad="38100" dist="38100" dir="2700000" algn="tl">
+                  <a:srgbClr val="00B050">
+                    <a:alpha val="43000"/>
+                  </a:srgbClr>
+                </a:outerShdw>
+              </a:effectLst>
+              <a:latin typeface="Franklin Gothic Heavy" panose="020B0903020102020204" pitchFamily="34" charset="0"/>
+            </a:endParaRPr>
+          </a:p>
+        </p:txBody>
+      </p:sp>
+      <p:sp>
+        <p:nvSpPr>
+          <p:cNvPr id="5" name="Rectangle 4">
+            <a:extLst>
+              <a:ext uri="{FF2B5EF4-FFF2-40B4-BE49-F238E27FC236}">
+                <a16:creationId xmlns:a16="http://schemas.microsoft.com/office/drawing/2014/main" id="{EF6368CF-E721-4198-A525-07753CFD36E8}"/>
+              </a:ext>
+            </a:extLst>
+          </p:cNvPr>
+          <p:cNvSpPr/>
+          <p:nvPr/>
+        </p:nvSpPr>
+        <p:spPr>
+          <a:xfrm>
+            <a:off x="10170741" y="6550223"/>
+            <a:ext cx="2021259" cy="307777"/>
+          </a:xfrm>
+          <a:prstGeom prst="rect">
+            <a:avLst/>
+          </a:prstGeom>
+          <a:noFill/>
+        </p:spPr>
+        <p:txBody>
+          <a:bodyPr wrap="none" lIns="91440" tIns="45720" rIns="91440" bIns="45720">
+            <a:spAutoFit/>
+          </a:bodyPr>
+          <a:lstStyle/>
+          <a:p>
+            <a:pPr algn="ctr"/>
+            <a:r>
+              <a:rPr lang="en-US" sz="1400" b="0" cap="none" spc="0" dirty="0">
+                <a:ln w="0"/>
+                <a:solidFill>
+                  <a:schemeClr val="tx1"/>
+                </a:solidFill>
+                <a:effectLst>
+                  <a:outerShdw blurRad="38100" dist="19050" dir="2700000" algn="tl" rotWithShape="0">
+                    <a:schemeClr val="dk1">
+                      <a:alpha val="40000"/>
+                    </a:schemeClr>
+                  </a:outerShdw>
+                </a:effectLst>
+                <a:latin typeface="Cambria" panose="02040503050406030204" pitchFamily="18" charset="0"/>
+                <a:ea typeface="Cambria" panose="02040503050406030204" pitchFamily="18" charset="0"/>
+              </a:rPr>
+              <a:t>Made by: </a:t>
+            </a:r>
+            <a:r>
+              <a:rPr lang="en-US" sz="1400" b="0" cap="none" spc="0" dirty="0" err="1">
+                <a:ln w="0"/>
+                <a:solidFill>
+                  <a:schemeClr val="tx1"/>
+                </a:solidFill>
+                <a:effectLst>
+                  <a:outerShdw blurRad="38100" dist="19050" dir="2700000" algn="tl" rotWithShape="0">
+                    <a:schemeClr val="dk1">
+                      <a:alpha val="40000"/>
+                    </a:schemeClr>
+                  </a:outerShdw>
+                </a:effectLst>
+                <a:latin typeface="Cambria" panose="02040503050406030204" pitchFamily="18" charset="0"/>
+                <a:ea typeface="Cambria" panose="02040503050406030204" pitchFamily="18" charset="0"/>
+              </a:rPr>
+              <a:t>Seongrok</a:t>
+            </a:r>
+            <a:r>
+              <a:rPr lang="en-US" sz="1400" b="0" cap="none" spc="0" dirty="0">
+                <a:ln w="0"/>
+                <a:solidFill>
+                  <a:schemeClr val="tx1"/>
+                </a:solidFill>
+                <a:effectLst>
+                  <a:outerShdw blurRad="38100" dist="19050" dir="2700000" algn="tl" rotWithShape="0">
+                    <a:schemeClr val="dk1">
+                      <a:alpha val="40000"/>
+                    </a:schemeClr>
+                  </a:outerShdw>
+                </a:effectLst>
+                <a:latin typeface="Cambria" panose="02040503050406030204" pitchFamily="18" charset="0"/>
+                <a:ea typeface="Cambria" panose="02040503050406030204" pitchFamily="18" charset="0"/>
+              </a:rPr>
+              <a:t> Shin</a:t>
+            </a:r>
+          </a:p>
+        </p:txBody>
+      </p:sp>
+      <p:sp>
+        <p:nvSpPr>
+          <p:cNvPr id="6" name="Rectangle 5">
+            <a:extLst>
+              <a:ext uri="{FF2B5EF4-FFF2-40B4-BE49-F238E27FC236}">
+                <a16:creationId xmlns:a16="http://schemas.microsoft.com/office/drawing/2014/main" id="{7321992B-CD89-423B-A22E-2CA34CE31F87}"/>
+              </a:ext>
+            </a:extLst>
+          </p:cNvPr>
+          <p:cNvSpPr/>
+          <p:nvPr/>
+        </p:nvSpPr>
+        <p:spPr>
+          <a:xfrm>
+            <a:off x="7629525" y="138499"/>
+            <a:ext cx="4562475" cy="1200329"/>
+          </a:xfrm>
+          <a:prstGeom prst="rect">
+            <a:avLst/>
+          </a:prstGeom>
+          <a:noFill/>
+        </p:spPr>
+        <p:txBody>
+          <a:bodyPr wrap="square" lIns="91440" tIns="45720" rIns="91440" bIns="45720">
+            <a:spAutoFit/>
+          </a:bodyPr>
+          <a:lstStyle/>
+          <a:p>
+            <a:pPr algn="ctr"/>
+            <a:r>
+              <a:rPr lang="en-US" sz="3600" b="0" cap="none" spc="0" dirty="0">
+                <a:ln w="0"/>
+                <a:solidFill>
+                  <a:schemeClr val="tx1"/>
+                </a:solidFill>
+                <a:effectLst>
+                  <a:outerShdw blurRad="38100" dist="19050" dir="2700000" algn="tl" rotWithShape="0">
+                    <a:schemeClr val="dk1">
+                      <a:alpha val="40000"/>
+                    </a:schemeClr>
+                  </a:outerShdw>
+                </a:effectLst>
+                <a:latin typeface="Cambria" panose="02040503050406030204" pitchFamily="18" charset="0"/>
+                <a:ea typeface="Cambria" panose="02040503050406030204" pitchFamily="18" charset="0"/>
+              </a:rPr>
+              <a:t>The Impacts of Social Media on Society</a:t>
+            </a:r>
+          </a:p>
+        </p:txBody>
+      </p:sp>
+      <p:sp>
+        <p:nvSpPr>
+          <p:cNvPr id="7" name="Rectangle 6">
+            <a:extLst>
+              <a:ext uri="{FF2B5EF4-FFF2-40B4-BE49-F238E27FC236}">
+                <a16:creationId xmlns:a16="http://schemas.microsoft.com/office/drawing/2014/main" id="{7D578D1A-C945-41DB-BEA7-19E54D8B95EA}"/>
+              </a:ext>
+            </a:extLst>
+          </p:cNvPr>
+          <p:cNvSpPr/>
+          <p:nvPr/>
+        </p:nvSpPr>
+        <p:spPr>
+          <a:xfrm>
+            <a:off x="0" y="3322065"/>
+            <a:ext cx="1867371" cy="923330"/>
+          </a:xfrm>
+          <a:prstGeom prst="rect">
+            <a:avLst/>
+          </a:prstGeom>
+          <a:noFill/>
+        </p:spPr>
+        <p:txBody>
+          <a:bodyPr wrap="none" lIns="91440" tIns="45720" rIns="91440" bIns="45720">
+            <a:spAutoFit/>
+          </a:bodyPr>
+          <a:lstStyle/>
+          <a:p>
+            <a:pPr algn="ctr"/>
+            <a:r>
+              <a:rPr lang="en-US" sz="5400" dirty="0">
+                <a:ln w="0"/>
+                <a:effectLst>
+                  <a:outerShdw blurRad="38100" dist="38100" dir="2700000" algn="tl">
+                    <a:srgbClr val="00B0F0">
+                      <a:alpha val="43000"/>
+                    </a:srgbClr>
+                  </a:outerShdw>
+                </a:effectLst>
+                <a:latin typeface="Franklin Gothic Heavy" panose="020B0903020102020204" pitchFamily="34" charset="0"/>
+              </a:rPr>
+              <a:t>Topic</a:t>
+            </a:r>
+            <a:endParaRPr lang="en-US" sz="5400" b="0" cap="none" spc="0" dirty="0">
+              <a:ln w="0"/>
+              <a:effectLst>
+                <a:outerShdw blurRad="38100" dist="38100" dir="2700000" algn="tl">
+                  <a:srgbClr val="00B0F0">
+                    <a:alpha val="43000"/>
+                  </a:srgbClr>
+                </a:outerShdw>
+              </a:effectLst>
+              <a:latin typeface="Franklin Gothic Heavy" panose="020B0903020102020204" pitchFamily="34" charset="0"/>
+            </a:endParaRPr>
+          </a:p>
+        </p:txBody>
+      </p:sp>
+    </p:spTree>
+    <p:extLst>
+      <p:ext uri="{BB962C8B-B14F-4D97-AF65-F5344CB8AC3E}">
+        <p14:creationId xmlns:p14="http://schemas.microsoft.com/office/powerpoint/2010/main" val="1117460622"/>
+      </p:ext>
+    </p:extLst>
+  </p:cSld>
+  <p:clrMapOvr>
+    <a:masterClrMapping/>
+  </p:clrMapOvr>
+</p:sld>
+</file>
+
+<file path=ppt/slides/slide2.xml><?xml version="1.0" encoding="utf-8"?>
+<p:sld xmlns:a="http://schemas.openxmlformats.org/drawingml/2006/main" xmlns:r="http://schemas.openxmlformats.org/officeDocument/2006/relationships" xmlns:p="http://schemas.openxmlformats.org/presentationml/2006/main">
+  <p:cSld>
+    <p:spTree>
+      <p:nvGrpSpPr>
+        <p:cNvPr id="1" name=""/>
+        <p:cNvGrpSpPr/>
+        <p:nvPr/>
+      </p:nvGrpSpPr>
+      <p:grpSpPr>
+        <a:xfrm>
+          <a:off x="0" y="0"/>
+          <a:ext cx="0" cy="0"/>
+          <a:chOff x="0" y="0"/>
+          <a:chExt cx="0" cy="0"/>
+        </a:xfrm>
+      </p:grpSpPr>
+      <p:sp>
+        <p:nvSpPr>
+          <p:cNvPr id="11" name="Rectangle 10">
+            <a:extLst>
+              <a:ext uri="{FF2B5EF4-FFF2-40B4-BE49-F238E27FC236}">
+                <a16:creationId xmlns:a16="http://schemas.microsoft.com/office/drawing/2014/main" id="{F73A7932-5662-460D-8B06-3EF6D2065E16}"/>
+              </a:ext>
+            </a:extLst>
+          </p:cNvPr>
+          <p:cNvSpPr/>
+          <p:nvPr/>
+        </p:nvSpPr>
+        <p:spPr>
+          <a:xfrm>
+            <a:off x="9807191" y="2758379"/>
+            <a:ext cx="317758" cy="3160285"/>
           </a:xfrm>
           <a:prstGeom prst="rect">
             <a:avLst/>
@@ -3427,7 +4150,7 @@
         </p:nvSpPr>
         <p:spPr>
           <a:xfrm>
-            <a:off x="0" y="0"/>
+            <a:off x="9412072" y="1338828"/>
             <a:ext cx="2779928" cy="923330"/>
           </a:xfrm>
           <a:prstGeom prst="rect">
@@ -3484,8 +4207,8 @@
         </p:nvSpPr>
         <p:spPr>
           <a:xfrm>
-            <a:off x="9600008" y="6550223"/>
-            <a:ext cx="2591992" cy="307777"/>
+            <a:off x="8655967" y="6550223"/>
+            <a:ext cx="3536033" cy="307777"/>
           </a:xfrm>
           <a:prstGeom prst="rect">
             <a:avLst/>
@@ -3515,7 +4238,7 @@
                 <a:latin typeface="Cambria" panose="02040503050406030204" pitchFamily="18" charset="0"/>
                 <a:ea typeface="Cambria" panose="02040503050406030204" pitchFamily="18" charset="0"/>
               </a:rPr>
-              <a:t>Made by: Charlie Renton-Deans</a:t>
+              <a:t>Made by: Charlie Renton-Deans &amp; Jason Rau</a:t>
             </a:r>
           </a:p>
         </p:txBody>
@@ -3584,7 +4307,7 @@
         </p:nvSpPr>
         <p:spPr>
           <a:xfrm>
-            <a:off x="84352" y="2740261"/>
+            <a:off x="9979540" y="4172930"/>
             <a:ext cx="2220699" cy="369332"/>
           </a:xfrm>
           <a:prstGeom prst="rect">
@@ -3634,7 +4357,7 @@
         </p:nvSpPr>
         <p:spPr>
           <a:xfrm>
-            <a:off x="84353" y="3566028"/>
+            <a:off x="9971302" y="5448982"/>
             <a:ext cx="2220698" cy="369332"/>
           </a:xfrm>
           <a:prstGeom prst="rect">
@@ -3684,7 +4407,7 @@
         </p:nvSpPr>
         <p:spPr>
           <a:xfrm>
-            <a:off x="84352" y="1914495"/>
+            <a:off x="9979540" y="2896879"/>
             <a:ext cx="2220699" cy="369332"/>
           </a:xfrm>
           <a:prstGeom prst="rect">
@@ -3734,8 +4457,8 @@
         </p:nvSpPr>
         <p:spPr>
           <a:xfrm>
-            <a:off x="2401285" y="1775995"/>
-            <a:ext cx="4973424" cy="646331"/>
+            <a:off x="6263358" y="2627188"/>
+            <a:ext cx="3669760" cy="923330"/>
           </a:xfrm>
           <a:prstGeom prst="rect">
             <a:avLst/>
@@ -3799,8 +4522,8 @@
         </p:nvSpPr>
         <p:spPr>
           <a:xfrm>
-            <a:off x="2401285" y="2599475"/>
-            <a:ext cx="4973424" cy="646331"/>
+            <a:off x="6223606" y="3876856"/>
+            <a:ext cx="3669760" cy="923330"/>
           </a:xfrm>
           <a:prstGeom prst="rect">
             <a:avLst/>
@@ -3861,8 +4584,8 @@
         </p:nvSpPr>
         <p:spPr>
           <a:xfrm>
-            <a:off x="2401285" y="3427528"/>
-            <a:ext cx="4973424" cy="646331"/>
+            <a:off x="6241002" y="5171983"/>
+            <a:ext cx="3669760" cy="923330"/>
           </a:xfrm>
           <a:prstGeom prst="rect">
             <a:avLst/>
@@ -3897,42 +4620,12 @@
           </a:p>
         </p:txBody>
       </p:sp>
-    </p:spTree>
-    <p:extLst>
-      <p:ext uri="{BB962C8B-B14F-4D97-AF65-F5344CB8AC3E}">
-        <p14:creationId xmlns:p14="http://schemas.microsoft.com/office/powerpoint/2010/main" val="2932172237"/>
-      </p:ext>
-    </p:extLst>
-  </p:cSld>
-  <p:clrMapOvr>
-    <a:masterClrMapping/>
-  </p:clrMapOvr>
-</p:sld>
-</file>
-
-<file path=ppt/slides/slide2.xml><?xml version="1.0" encoding="utf-8"?>
-<p:sld xmlns:a="http://schemas.openxmlformats.org/drawingml/2006/main" xmlns:r="http://schemas.openxmlformats.org/officeDocument/2006/relationships" xmlns:p="http://schemas.openxmlformats.org/presentationml/2006/main">
-  <p:cSld>
-    <p:spTree>
-      <p:nvGrpSpPr>
-        <p:cNvPr id="1" name=""/>
-        <p:cNvGrpSpPr/>
-        <p:nvPr/>
-      </p:nvGrpSpPr>
-      <p:grpSpPr>
-        <a:xfrm>
-          <a:off x="0" y="0"/>
-          <a:ext cx="0" cy="0"/>
-          <a:chOff x="0" y="0"/>
-          <a:chExt cx="0" cy="0"/>
-        </a:xfrm>
-      </p:grpSpPr>
-      <p:sp>
-        <p:nvSpPr>
-          <p:cNvPr id="4" name="Rectangle 3">
-            <a:extLst>
-              <a:ext uri="{FF2B5EF4-FFF2-40B4-BE49-F238E27FC236}">
-                <a16:creationId xmlns:a16="http://schemas.microsoft.com/office/drawing/2014/main" id="{6A357B6E-43CB-47B6-A983-DCE7B7F1F1CA}"/>
+      <p:sp>
+        <p:nvSpPr>
+          <p:cNvPr id="12" name="Rectangle 11">
+            <a:extLst>
+              <a:ext uri="{FF2B5EF4-FFF2-40B4-BE49-F238E27FC236}">
+                <a16:creationId xmlns:a16="http://schemas.microsoft.com/office/drawing/2014/main" id="{445E8D33-1B12-4394-818A-C383694A90C7}"/>
               </a:ext>
             </a:extLst>
           </p:cNvPr>
@@ -3942,7 +4635,7 @@
         <p:spPr>
           <a:xfrm>
             <a:off x="0" y="0"/>
-            <a:ext cx="4675704" cy="923330"/>
+            <a:ext cx="1999265" cy="923330"/>
           </a:xfrm>
           <a:prstGeom prst="rect">
             <a:avLst/>
@@ -3960,27 +4653,27 @@
               <a:rPr lang="en-US" sz="5400" dirty="0">
                 <a:ln w="0"/>
                 <a:solidFill>
-                  <a:srgbClr val="00B050"/>
+                  <a:srgbClr val="FF0000"/>
                 </a:solidFill>
                 <a:effectLst>
                   <a:outerShdw blurRad="38100" dist="38100" dir="2700000" algn="tl">
-                    <a:srgbClr val="00B050">
+                    <a:srgbClr val="FF0000">
                       <a:alpha val="43000"/>
                     </a:srgbClr>
                   </a:outerShdw>
                 </a:effectLst>
                 <a:latin typeface="Franklin Gothic Heavy" panose="020B0903020102020204" pitchFamily="34" charset="0"/>
               </a:rPr>
-              <a:t>Opportunities</a:t>
+              <a:t>Risks</a:t>
             </a:r>
             <a:endParaRPr lang="en-US" sz="5400" b="0" cap="none" spc="0" dirty="0">
               <a:ln w="0"/>
               <a:solidFill>
-                <a:srgbClr val="00B050"/>
+                <a:srgbClr val="FF0000"/>
               </a:solidFill>
               <a:effectLst>
                 <a:outerShdw blurRad="38100" dist="38100" dir="2700000" algn="tl">
-                  <a:srgbClr val="00B050">
+                  <a:srgbClr val="FF0000">
                     <a:alpha val="43000"/>
                   </a:srgbClr>
                 </a:outerShdw>
@@ -3992,20 +4685,20 @@
       </p:sp>
       <p:sp>
         <p:nvSpPr>
-          <p:cNvPr id="5" name="Rectangle 4">
-            <a:extLst>
-              <a:ext uri="{FF2B5EF4-FFF2-40B4-BE49-F238E27FC236}">
-                <a16:creationId xmlns:a16="http://schemas.microsoft.com/office/drawing/2014/main" id="{EF6368CF-E721-4198-A525-07753CFD36E8}"/>
-              </a:ext>
-            </a:extLst>
-          </p:cNvPr>
-          <p:cNvSpPr/>
+          <p:cNvPr id="16" name="TextBox 15">
+            <a:extLst>
+              <a:ext uri="{FF2B5EF4-FFF2-40B4-BE49-F238E27FC236}">
+                <a16:creationId xmlns:a16="http://schemas.microsoft.com/office/drawing/2014/main" id="{6BAAEECB-B76D-4FCB-B3D2-0D03E0B177C9}"/>
+              </a:ext>
+            </a:extLst>
+          </p:cNvPr>
+          <p:cNvSpPr txBox="1"/>
           <p:nvPr/>
         </p:nvSpPr>
         <p:spPr>
           <a:xfrm>
-            <a:off x="10170741" y="6550223"/>
-            <a:ext cx="2021259" cy="307777"/>
+            <a:off x="347425" y="2455774"/>
+            <a:ext cx="3247646" cy="1200329"/>
           </a:xfrm>
           <a:prstGeom prst="rect">
             <a:avLst/>
@@ -4013,14 +4706,55 @@
           <a:noFill/>
         </p:spPr>
         <p:txBody>
-          <a:bodyPr wrap="none" lIns="91440" tIns="45720" rIns="91440" bIns="45720">
+          <a:bodyPr wrap="square">
             <a:spAutoFit/>
           </a:bodyPr>
           <a:lstStyle/>
           <a:p>
+            <a:r>
+              <a:rPr lang="en-NZ" dirty="0">
+                <a:hlinkClick r:id="rId3"/>
+              </a:rPr>
+              <a:t>https://arstechnica.com/gadgets/2021/05/96-of-us-users-opt-out-of-app-tracking-in-ios-14-5-analytics-find/</a:t>
+            </a:r>
+            <a:r>
+              <a:rPr lang="en-NZ" dirty="0"/>
+              <a:t> </a:t>
+            </a:r>
+          </a:p>
+        </p:txBody>
+      </p:sp>
+      <p:sp>
+        <p:nvSpPr>
+          <p:cNvPr id="17" name="Rectangle 16">
+            <a:extLst>
+              <a:ext uri="{FF2B5EF4-FFF2-40B4-BE49-F238E27FC236}">
+                <a16:creationId xmlns:a16="http://schemas.microsoft.com/office/drawing/2014/main" id="{EE9BEE44-85BD-4A95-BEC0-DA76D57305D6}"/>
+              </a:ext>
+            </a:extLst>
+          </p:cNvPr>
+          <p:cNvSpPr/>
+          <p:nvPr/>
+        </p:nvSpPr>
+        <p:spPr>
+          <a:xfrm>
+            <a:off x="41044" y="1035447"/>
+            <a:ext cx="3554027" cy="1323439"/>
+          </a:xfrm>
+          <a:prstGeom prst="rect">
+            <a:avLst/>
+          </a:prstGeom>
+          <a:noFill/>
+        </p:spPr>
+        <p:txBody>
+          <a:bodyPr wrap="square" lIns="91440" tIns="45720" rIns="91440" bIns="45720">
+            <a:spAutoFit/>
+          </a:bodyPr>
+          <a:lstStyle/>
+          <a:p>
             <a:pPr algn="ctr"/>
             <a:r>
-              <a:rPr lang="en-US" sz="1400" b="0" cap="none" spc="0" dirty="0">
+              <a:rPr lang="en-US" sz="2000" b="0" cap="none" spc="0" dirty="0">
                 <a:ln w="0"/>
                 <a:solidFill>
                   <a:schemeClr val="tx1"/>
@@ -4032,17 +4766,15 @@
                     </a:schemeClr>
                   </a:outerShdw>
                 </a:effectLst>
-                <a:latin typeface="Cambria" panose="02040503050406030204" pitchFamily="18" charset="0"/>
-                <a:ea typeface="Cambria" panose="02040503050406030204" pitchFamily="18" charset="0"/>
               </a:rPr>
-              <a:t>Made by: </a:t>
-            </a:r>
-            <a:r>
-              <a:rPr lang="en-US" sz="1400" b="0" cap="none" spc="0" dirty="0" err="1">
+              <a:t>Jason, check out this article… it might be a good one to reference</a:t>
+            </a:r>
+          </a:p>
+          <a:p>
+            <a:pPr algn="ctr"/>
+            <a:r>
+              <a:rPr lang="en-US" sz="2000" dirty="0">
                 <a:ln w="0"/>
-                <a:solidFill>
-                  <a:schemeClr val="tx1"/>
-                </a:solidFill>
                 <a:effectLst>
                   <a:outerShdw blurRad="38100" dist="19050" dir="2700000" algn="tl" rotWithShape="0">
                     <a:schemeClr val="dk1">
@@ -4050,86 +4782,29 @@
                     </a:schemeClr>
                   </a:outerShdw>
                 </a:effectLst>
-                <a:latin typeface="Cambria" panose="02040503050406030204" pitchFamily="18" charset="0"/>
-                <a:ea typeface="Cambria" panose="02040503050406030204" pitchFamily="18" charset="0"/>
               </a:rPr>
-              <a:t>Seongrok</a:t>
-            </a:r>
-            <a:r>
-              <a:rPr lang="en-US" sz="1400" b="0" cap="none" spc="0" dirty="0">
-                <a:ln w="0"/>
-                <a:solidFill>
-                  <a:schemeClr val="tx1"/>
-                </a:solidFill>
-                <a:effectLst>
-                  <a:outerShdw blurRad="38100" dist="19050" dir="2700000" algn="tl" rotWithShape="0">
-                    <a:schemeClr val="dk1">
-                      <a:alpha val="40000"/>
-                    </a:schemeClr>
-                  </a:outerShdw>
-                </a:effectLst>
-                <a:latin typeface="Cambria" panose="02040503050406030204" pitchFamily="18" charset="0"/>
-                <a:ea typeface="Cambria" panose="02040503050406030204" pitchFamily="18" charset="0"/>
-              </a:rPr>
-              <a:t> Shin</a:t>
-            </a:r>
-          </a:p>
-        </p:txBody>
-      </p:sp>
-      <p:sp>
-        <p:nvSpPr>
-          <p:cNvPr id="6" name="Rectangle 5">
-            <a:extLst>
-              <a:ext uri="{FF2B5EF4-FFF2-40B4-BE49-F238E27FC236}">
-                <a16:creationId xmlns:a16="http://schemas.microsoft.com/office/drawing/2014/main" id="{7321992B-CD89-423B-A22E-2CA34CE31F87}"/>
-              </a:ext>
-            </a:extLst>
-          </p:cNvPr>
-          <p:cNvSpPr/>
-          <p:nvPr/>
-        </p:nvSpPr>
-        <p:spPr>
-          <a:xfrm>
-            <a:off x="7629525" y="138499"/>
-            <a:ext cx="4562475" cy="1200329"/>
-          </a:xfrm>
-          <a:prstGeom prst="rect">
-            <a:avLst/>
-          </a:prstGeom>
-          <a:noFill/>
-        </p:spPr>
-        <p:txBody>
-          <a:bodyPr wrap="square" lIns="91440" tIns="45720" rIns="91440" bIns="45720">
-            <a:spAutoFit/>
-          </a:bodyPr>
-          <a:lstStyle/>
-          <a:p>
-            <a:pPr algn="ctr"/>
-            <a:r>
-              <a:rPr lang="en-US" sz="3600" b="0" cap="none" spc="0" dirty="0">
-                <a:ln w="0"/>
-                <a:solidFill>
-                  <a:schemeClr val="tx1"/>
-                </a:solidFill>
-                <a:effectLst>
-                  <a:outerShdw blurRad="38100" dist="19050" dir="2700000" algn="tl" rotWithShape="0">
-                    <a:schemeClr val="dk1">
-                      <a:alpha val="40000"/>
-                    </a:schemeClr>
-                  </a:outerShdw>
-                </a:effectLst>
-                <a:latin typeface="Cambria" panose="02040503050406030204" pitchFamily="18" charset="0"/>
-                <a:ea typeface="Cambria" panose="02040503050406030204" pitchFamily="18" charset="0"/>
-              </a:rPr>
-              <a:t>The Impacts of Social Media on Society</a:t>
-            </a:r>
+              <a:t>-Charlie</a:t>
+            </a:r>
+            <a:endParaRPr lang="en-US" sz="2000" b="0" cap="none" spc="0" dirty="0">
+              <a:ln w="0"/>
+              <a:solidFill>
+                <a:schemeClr val="tx1"/>
+              </a:solidFill>
+              <a:effectLst>
+                <a:outerShdw blurRad="38100" dist="19050" dir="2700000" algn="tl" rotWithShape="0">
+                  <a:schemeClr val="dk1">
+                    <a:alpha val="40000"/>
+                  </a:schemeClr>
+                </a:outerShdw>
+              </a:effectLst>
+            </a:endParaRPr>
           </a:p>
         </p:txBody>
       </p:sp>
     </p:spTree>
     <p:extLst>
       <p:ext uri="{BB962C8B-B14F-4D97-AF65-F5344CB8AC3E}">
-        <p14:creationId xmlns:p14="http://schemas.microsoft.com/office/powerpoint/2010/main" val="1117460622"/>
+        <p14:creationId xmlns:p14="http://schemas.microsoft.com/office/powerpoint/2010/main" val="2932172237"/>
       </p:ext>
     </p:extLst>
   </p:cSld>
@@ -4158,69 +4833,6 @@
       </p:grpSpPr>
       <p:sp>
         <p:nvSpPr>
-          <p:cNvPr id="4" name="Rectangle 3">
-            <a:extLst>
-              <a:ext uri="{FF2B5EF4-FFF2-40B4-BE49-F238E27FC236}">
-                <a16:creationId xmlns:a16="http://schemas.microsoft.com/office/drawing/2014/main" id="{DC31EF51-D710-4B6A-9987-CBD4767D1EF9}"/>
-              </a:ext>
-            </a:extLst>
-          </p:cNvPr>
-          <p:cNvSpPr/>
-          <p:nvPr/>
-        </p:nvSpPr>
-        <p:spPr>
-          <a:xfrm>
-            <a:off x="0" y="0"/>
-            <a:ext cx="1999265" cy="923330"/>
-          </a:xfrm>
-          <a:prstGeom prst="rect">
-            <a:avLst/>
-          </a:prstGeom>
-          <a:noFill/>
-        </p:spPr>
-        <p:txBody>
-          <a:bodyPr wrap="none" lIns="91440" tIns="45720" rIns="91440" bIns="45720">
-            <a:spAutoFit/>
-          </a:bodyPr>
-          <a:lstStyle/>
-          <a:p>
-            <a:pPr algn="ctr"/>
-            <a:r>
-              <a:rPr lang="en-US" sz="5400" dirty="0">
-                <a:ln w="0"/>
-                <a:solidFill>
-                  <a:srgbClr val="FF0000"/>
-                </a:solidFill>
-                <a:effectLst>
-                  <a:outerShdw blurRad="38100" dist="38100" dir="2700000" algn="tl">
-                    <a:srgbClr val="FF0000">
-                      <a:alpha val="43000"/>
-                    </a:srgbClr>
-                  </a:outerShdw>
-                </a:effectLst>
-                <a:latin typeface="Franklin Gothic Heavy" panose="020B0903020102020204" pitchFamily="34" charset="0"/>
-              </a:rPr>
-              <a:t>Risks</a:t>
-            </a:r>
-            <a:endParaRPr lang="en-US" sz="5400" b="0" cap="none" spc="0" dirty="0">
-              <a:ln w="0"/>
-              <a:solidFill>
-                <a:srgbClr val="FF0000"/>
-              </a:solidFill>
-              <a:effectLst>
-                <a:outerShdw blurRad="38100" dist="38100" dir="2700000" algn="tl">
-                  <a:srgbClr val="FF0000">
-                    <a:alpha val="43000"/>
-                  </a:srgbClr>
-                </a:outerShdw>
-              </a:effectLst>
-              <a:latin typeface="Franklin Gothic Heavy" panose="020B0903020102020204" pitchFamily="34" charset="0"/>
-            </a:endParaRPr>
-          </a:p>
-        </p:txBody>
-      </p:sp>
-      <p:sp>
-        <p:nvSpPr>
           <p:cNvPr id="5" name="Rectangle 4">
             <a:extLst>
               <a:ext uri="{FF2B5EF4-FFF2-40B4-BE49-F238E27FC236}">
@@ -4321,20 +4933,20 @@
       </p:sp>
       <p:sp>
         <p:nvSpPr>
-          <p:cNvPr id="8" name="TextBox 7">
-            <a:extLst>
-              <a:ext uri="{FF2B5EF4-FFF2-40B4-BE49-F238E27FC236}">
-                <a16:creationId xmlns:a16="http://schemas.microsoft.com/office/drawing/2014/main" id="{17CC8261-BEAE-4E68-8592-233C5203D469}"/>
-              </a:ext>
-            </a:extLst>
-          </p:cNvPr>
-          <p:cNvSpPr txBox="1"/>
+          <p:cNvPr id="2" name="Rectangle 1">
+            <a:extLst>
+              <a:ext uri="{FF2B5EF4-FFF2-40B4-BE49-F238E27FC236}">
+                <a16:creationId xmlns:a16="http://schemas.microsoft.com/office/drawing/2014/main" id="{CE64BA25-B67C-426D-9148-CFE306B6BA21}"/>
+              </a:ext>
+            </a:extLst>
+          </p:cNvPr>
+          <p:cNvSpPr/>
           <p:nvPr/>
         </p:nvSpPr>
         <p:spPr>
           <a:xfrm>
-            <a:off x="999632" y="3218021"/>
-            <a:ext cx="6357936" cy="646331"/>
+            <a:off x="556832" y="2967335"/>
+            <a:ext cx="11078354" cy="1754326"/>
           </a:xfrm>
           <a:prstGeom prst="rect">
             <a:avLst/>
@@ -4342,47 +4954,6 @@
           <a:noFill/>
         </p:spPr>
         <p:txBody>
-          <a:bodyPr wrap="square">
-            <a:spAutoFit/>
-          </a:bodyPr>
-          <a:lstStyle/>
-          <a:p>
-            <a:r>
-              <a:rPr lang="en-NZ" dirty="0">
-                <a:hlinkClick r:id="rId2"/>
-              </a:rPr>
-              <a:t>https://arstechnica.com/gadgets/2021/05/96-of-us-users-opt-out-of-app-tracking-in-ios-14-5-analytics-find/</a:t>
-            </a:r>
-            <a:r>
-              <a:rPr lang="en-NZ" dirty="0"/>
-              <a:t> </a:t>
-            </a:r>
-          </a:p>
-        </p:txBody>
-      </p:sp>
-      <p:sp>
-        <p:nvSpPr>
-          <p:cNvPr id="3" name="Rectangle 2">
-            <a:extLst>
-              <a:ext uri="{FF2B5EF4-FFF2-40B4-BE49-F238E27FC236}">
-                <a16:creationId xmlns:a16="http://schemas.microsoft.com/office/drawing/2014/main" id="{9BC3C706-4155-4D30-916A-1D10AE59DE1C}"/>
-              </a:ext>
-            </a:extLst>
-          </p:cNvPr>
-          <p:cNvSpPr/>
-          <p:nvPr/>
-        </p:nvSpPr>
-        <p:spPr>
-          <a:xfrm>
-            <a:off x="569265" y="2510135"/>
-            <a:ext cx="6957739" cy="707886"/>
-          </a:xfrm>
-          <a:prstGeom prst="rect">
-            <a:avLst/>
-          </a:prstGeom>
-          <a:noFill/>
-        </p:spPr>
-        <p:txBody>
           <a:bodyPr wrap="none" lIns="91440" tIns="45720" rIns="91440" bIns="45720">
             <a:spAutoFit/>
           </a:bodyPr>
@@ -4390,7 +4961,7 @@
           <a:p>
             <a:pPr algn="ctr"/>
             <a:r>
-              <a:rPr lang="en-US" sz="2000" b="0" cap="none" spc="0" dirty="0">
+              <a:rPr lang="en-US" sz="5400" b="0" cap="none" spc="0" dirty="0">
                 <a:ln w="0"/>
                 <a:solidFill>
                   <a:schemeClr val="tx1"/>
@@ -4403,13 +4974,13 @@
                   </a:outerShdw>
                 </a:effectLst>
               </a:rPr>
-              <a:t>Jason, check out this article… it might be a good one to reference</a:t>
+              <a:t>Roles and responsibilities</a:t>
             </a:r>
           </a:p>
           <a:p>
             <a:pPr algn="ctr"/>
             <a:r>
-              <a:rPr lang="en-US" sz="2000" dirty="0">
+              <a:rPr lang="en-US" sz="5400" dirty="0">
                 <a:ln w="0"/>
                 <a:effectLst>
                   <a:outerShdw blurRad="38100" dist="19050" dir="2700000" algn="tl" rotWithShape="0">
@@ -4419,9 +4990,9 @@
                   </a:outerShdw>
                 </a:effectLst>
               </a:rPr>
-              <a:t>-Charlie</a:t>
-            </a:r>
-            <a:endParaRPr lang="en-US" sz="2000" b="0" cap="none" spc="0" dirty="0">
+              <a:t>Present the topic with scholarly source</a:t>
+            </a:r>
+            <a:endParaRPr lang="en-US" sz="5400" b="0" cap="none" spc="0" dirty="0">
               <a:ln w="0"/>
               <a:solidFill>
                 <a:schemeClr val="tx1"/>
@@ -4743,4 +5314,299 @@
     </a:ext>
   </a:extLst>
 </a:theme>
+</file>
+
+<file path=ppt/theme/theme2.xml><?xml version="1.0" encoding="utf-8"?>
+<a:theme xmlns:a="http://schemas.openxmlformats.org/drawingml/2006/main" name="Office Theme">
+  <a:themeElements>
+    <a:clrScheme name="Office">
+      <a:dk1>
+        <a:sysClr val="windowText" lastClr="000000"/>
+      </a:dk1>
+      <a:lt1>
+        <a:sysClr val="window" lastClr="FFFFFF"/>
+      </a:lt1>
+      <a:dk2>
+        <a:srgbClr val="44546A"/>
+      </a:dk2>
+      <a:lt2>
+        <a:srgbClr val="E7E6E6"/>
+      </a:lt2>
+      <a:accent1>
+        <a:srgbClr val="4472C4"/>
+      </a:accent1>
+      <a:accent2>
+        <a:srgbClr val="ED7D31"/>
+      </a:accent2>
+      <a:accent3>
+        <a:srgbClr val="A5A5A5"/>
+      </a:accent3>
+      <a:accent4>
+        <a:srgbClr val="FFC000"/>
+      </a:accent4>
+      <a:accent5>
+        <a:srgbClr val="5B9BD5"/>
+      </a:accent5>
+      <a:accent6>
+        <a:srgbClr val="70AD47"/>
+      </a:accent6>
+      <a:hlink>
+        <a:srgbClr val="0563C1"/>
+      </a:hlink>
+      <a:folHlink>
+        <a:srgbClr val="954F72"/>
+      </a:folHlink>
+    </a:clrScheme>
+    <a:fontScheme name="Office">
+      <a:majorFont>
+        <a:latin typeface="Calibri Light" panose="020F0302020204030204"/>
+        <a:ea typeface=""/>
+        <a:cs typeface=""/>
+        <a:font script="Jpan" typeface="游ゴシック Light"/>
+        <a:font script="Hang" typeface="맑은 고딕"/>
+        <a:font script="Hans" typeface="等线 Light"/>
+        <a:font script="Hant" typeface="新細明體"/>
+        <a:font script="Arab" typeface="Times New Roman"/>
+        <a:font script="Hebr" typeface="Times New Roman"/>
+        <a:font script="Thai" typeface="Angsana New"/>
+        <a:font script="Ethi" typeface="Nyala"/>
+        <a:font script="Beng" typeface="Vrinda"/>
+        <a:font script="Gujr" typeface="Shruti"/>
+        <a:font script="Khmr" typeface="MoolBoran"/>
+        <a:font script="Knda" typeface="Tunga"/>
+        <a:font script="Guru" typeface="Raavi"/>
+        <a:font script="Cans" typeface="Euphemia"/>
+        <a:font script="Cher" typeface="Plantagenet Cherokee"/>
+        <a:font script="Yiii" typeface="Microsoft Yi Baiti"/>
+        <a:font script="Tibt" typeface="Microsoft Himalaya"/>
+        <a:font script="Thaa" typeface="MV Boli"/>
+        <a:font script="Deva" typeface="Mangal"/>
+        <a:font script="Telu" typeface="Gautami"/>
+        <a:font script="Taml" typeface="Latha"/>
+        <a:font script="Syrc" typeface="Estrangelo Edessa"/>
+        <a:font script="Orya" typeface="Kalinga"/>
+        <a:font script="Mlym" typeface="Kartika"/>
+        <a:font script="Laoo" typeface="DokChampa"/>
+        <a:font script="Sinh" typeface="Iskoola Pota"/>
+        <a:font script="Mong" typeface="Mongolian Baiti"/>
+        <a:font script="Viet" typeface="Times New Roman"/>
+        <a:font script="Uigh" typeface="Microsoft Uighur"/>
+        <a:font script="Geor" typeface="Sylfaen"/>
+        <a:font script="Armn" typeface="Arial"/>
+        <a:font script="Bugi" typeface="Leelawadee UI"/>
+        <a:font script="Bopo" typeface="Microsoft JhengHei"/>
+        <a:font script="Java" typeface="Javanese Text"/>
+        <a:font script="Lisu" typeface="Segoe UI"/>
+        <a:font script="Mymr" typeface="Myanmar Text"/>
+        <a:font script="Nkoo" typeface="Ebrima"/>
+        <a:font script="Olck" typeface="Nirmala UI"/>
+        <a:font script="Osma" typeface="Ebrima"/>
+        <a:font script="Phag" typeface="Phagspa"/>
+        <a:font script="Syrn" typeface="Estrangelo Edessa"/>
+        <a:font script="Syrj" typeface="Estrangelo Edessa"/>
+        <a:font script="Syre" typeface="Estrangelo Edessa"/>
+        <a:font script="Sora" typeface="Nirmala UI"/>
+        <a:font script="Tale" typeface="Microsoft Tai Le"/>
+        <a:font script="Talu" typeface="Microsoft New Tai Lue"/>
+        <a:font script="Tfng" typeface="Ebrima"/>
+      </a:majorFont>
+      <a:minorFont>
+        <a:latin typeface="Calibri" panose="020F0502020204030204"/>
+        <a:ea typeface=""/>
+        <a:cs typeface=""/>
+        <a:font script="Jpan" typeface="游ゴシック"/>
+        <a:font script="Hang" typeface="맑은 고딕"/>
+        <a:font script="Hans" typeface="等线"/>
+        <a:font script="Hant" typeface="新細明體"/>
+        <a:font script="Arab" typeface="Arial"/>
+        <a:font script="Hebr" typeface="Arial"/>
+        <a:font script="Thai" typeface="Cordia New"/>
+        <a:font script="Ethi" typeface="Nyala"/>
+        <a:font script="Beng" typeface="Vrinda"/>
+        <a:font script="Gujr" typeface="Shruti"/>
+        <a:font script="Khmr" typeface="DaunPenh"/>
+        <a:font script="Knda" typeface="Tunga"/>
+        <a:font script="Guru" typeface="Raavi"/>
+        <a:font script="Cans" typeface="Euphemia"/>
+        <a:font script="Cher" typeface="Plantagenet Cherokee"/>
+        <a:font script="Yiii" typeface="Microsoft Yi Baiti"/>
+        <a:font script="Tibt" typeface="Microsoft Himalaya"/>
+        <a:font script="Thaa" typeface="MV Boli"/>
+        <a:font script="Deva" typeface="Mangal"/>
+        <a:font script="Telu" typeface="Gautami"/>
+        <a:font script="Taml" typeface="Latha"/>
+        <a:font script="Syrc" typeface="Estrangelo Edessa"/>
+        <a:font script="Orya" typeface="Kalinga"/>
+        <a:font script="Mlym" typeface="Kartika"/>
+        <a:font script="Laoo" typeface="DokChampa"/>
+        <a:font script="Sinh" typeface="Iskoola Pota"/>
+        <a:font script="Mong" typeface="Mongolian Baiti"/>
+        <a:font script="Viet" typeface="Arial"/>
+        <a:font script="Uigh" typeface="Microsoft Uighur"/>
+        <a:font script="Geor" typeface="Sylfaen"/>
+        <a:font script="Armn" typeface="Arial"/>
+        <a:font script="Bugi" typeface="Leelawadee UI"/>
+        <a:font script="Bopo" typeface="Microsoft JhengHei"/>
+        <a:font script="Java" typeface="Javanese Text"/>
+        <a:font script="Lisu" typeface="Segoe UI"/>
+        <a:font script="Mymr" typeface="Myanmar Text"/>
+        <a:font script="Nkoo" typeface="Ebrima"/>
+        <a:font script="Olck" typeface="Nirmala UI"/>
+        <a:font script="Osma" typeface="Ebrima"/>
+        <a:font script="Phag" typeface="Phagspa"/>
+        <a:font script="Syrn" typeface="Estrangelo Edessa"/>
+        <a:font script="Syrj" typeface="Estrangelo Edessa"/>
+        <a:font script="Syre" typeface="Estrangelo Edessa"/>
+        <a:font script="Sora" typeface="Nirmala UI"/>
+        <a:font script="Tale" typeface="Microsoft Tai Le"/>
+        <a:font script="Talu" typeface="Microsoft New Tai Lue"/>
+        <a:font script="Tfng" typeface="Ebrima"/>
+      </a:minorFont>
+    </a:fontScheme>
+    <a:fmtScheme name="Office">
+      <a:fillStyleLst>
+        <a:solidFill>
+          <a:schemeClr val="phClr"/>
+        </a:solidFill>
+        <a:gradFill rotWithShape="1">
+          <a:gsLst>
+            <a:gs pos="0">
+              <a:schemeClr val="phClr">
+                <a:lumMod val="110000"/>
+                <a:satMod val="105000"/>
+                <a:tint val="67000"/>
+              </a:schemeClr>
+            </a:gs>
+            <a:gs pos="50000">
+              <a:schemeClr val="phClr">
+                <a:lumMod val="105000"/>
+                <a:satMod val="103000"/>
+                <a:tint val="73000"/>
+              </a:schemeClr>
+            </a:gs>
+            <a:gs pos="100000">
+              <a:schemeClr val="phClr">
+                <a:lumMod val="105000"/>
+                <a:satMod val="109000"/>
+                <a:tint val="81000"/>
+              </a:schemeClr>
+            </a:gs>
+          </a:gsLst>
+          <a:lin ang="5400000" scaled="0"/>
+        </a:gradFill>
+        <a:gradFill rotWithShape="1">
+          <a:gsLst>
+            <a:gs pos="0">
+              <a:schemeClr val="phClr">
+                <a:satMod val="103000"/>
+                <a:lumMod val="102000"/>
+                <a:tint val="94000"/>
+              </a:schemeClr>
+            </a:gs>
+            <a:gs pos="50000">
+              <a:schemeClr val="phClr">
+                <a:satMod val="110000"/>
+                <a:lumMod val="100000"/>
+                <a:shade val="100000"/>
+              </a:schemeClr>
+            </a:gs>
+            <a:gs pos="100000">
+              <a:schemeClr val="phClr">
+                <a:lumMod val="99000"/>
+                <a:satMod val="120000"/>
+                <a:shade val="78000"/>
+              </a:schemeClr>
+            </a:gs>
+          </a:gsLst>
+          <a:lin ang="5400000" scaled="0"/>
+        </a:gradFill>
+      </a:fillStyleLst>
+      <a:lnStyleLst>
+        <a:ln w="6350" cap="flat" cmpd="sng" algn="ctr">
+          <a:solidFill>
+            <a:schemeClr val="phClr"/>
+          </a:solidFill>
+          <a:prstDash val="solid"/>
+          <a:miter lim="800000"/>
+        </a:ln>
+        <a:ln w="12700" cap="flat" cmpd="sng" algn="ctr">
+          <a:solidFill>
+            <a:schemeClr val="phClr"/>
+          </a:solidFill>
+          <a:prstDash val="solid"/>
+          <a:miter lim="800000"/>
+        </a:ln>
+        <a:ln w="19050" cap="flat" cmpd="sng" algn="ctr">
+          <a:solidFill>
+            <a:schemeClr val="phClr"/>
+          </a:solidFill>
+          <a:prstDash val="solid"/>
+          <a:miter lim="800000"/>
+        </a:ln>
+      </a:lnStyleLst>
+      <a:effectStyleLst>
+        <a:effectStyle>
+          <a:effectLst/>
+        </a:effectStyle>
+        <a:effectStyle>
+          <a:effectLst/>
+        </a:effectStyle>
+        <a:effectStyle>
+          <a:effectLst>
+            <a:outerShdw blurRad="57150" dist="19050" dir="5400000" algn="ctr" rotWithShape="0">
+              <a:srgbClr val="000000">
+                <a:alpha val="63000"/>
+              </a:srgbClr>
+            </a:outerShdw>
+          </a:effectLst>
+        </a:effectStyle>
+      </a:effectStyleLst>
+      <a:bgFillStyleLst>
+        <a:solidFill>
+          <a:schemeClr val="phClr"/>
+        </a:solidFill>
+        <a:solidFill>
+          <a:schemeClr val="phClr">
+            <a:tint val="95000"/>
+            <a:satMod val="170000"/>
+          </a:schemeClr>
+        </a:solidFill>
+        <a:gradFill rotWithShape="1">
+          <a:gsLst>
+            <a:gs pos="0">
+              <a:schemeClr val="phClr">
+                <a:tint val="93000"/>
+                <a:satMod val="150000"/>
+                <a:shade val="98000"/>
+                <a:lumMod val="102000"/>
+              </a:schemeClr>
+            </a:gs>
+            <a:gs pos="50000">
+              <a:schemeClr val="phClr">
+                <a:tint val="98000"/>
+                <a:satMod val="130000"/>
+                <a:shade val="90000"/>
+                <a:lumMod val="103000"/>
+              </a:schemeClr>
+            </a:gs>
+            <a:gs pos="100000">
+              <a:schemeClr val="phClr">
+                <a:shade val="63000"/>
+                <a:satMod val="120000"/>
+              </a:schemeClr>
+            </a:gs>
+          </a:gsLst>
+          <a:lin ang="5400000" scaled="0"/>
+        </a:gradFill>
+      </a:bgFillStyleLst>
+    </a:fmtScheme>
+  </a:themeElements>
+  <a:objectDefaults/>
+  <a:extraClrSchemeLst/>
+  <a:extLst>
+    <a:ext uri="{05A4C25C-085E-4340-85A3-A5531E510DB2}">
+      <thm15:themeFamily xmlns:thm15="http://schemas.microsoft.com/office/thememl/2012/main" name="Office Theme" id="{62F939B6-93AF-4DB8-9C6B-D6C7DFDC589F}" vid="{4A3C46E8-61CC-4603-A589-7422A47A8E4A}"/>
+    </a:ext>
+  </a:extLst>
+</a:theme>
 </file>
</xml_diff>

<commit_message>
presentation and word doc updates
</commit_message>
<xml_diff>
--- a/Team Project Presentation/Team Project Presentation.pptx
+++ b/Team Project Presentation/Team Project Presentation.pptx
@@ -115,6 +115,123 @@
     </p:ext>
   </p:extLst>
 </p:presentation>
+</file>
+
+<file path=ppt/revisionInfo.xml><?xml version="1.0" encoding="utf-8"?>
+<p1510:revInfo xmlns:a="http://schemas.openxmlformats.org/drawingml/2006/main" xmlns:r="http://schemas.openxmlformats.org/officeDocument/2006/relationships" xmlns:p1510="http://schemas.microsoft.com/office/powerpoint/2015/10/main">
+  <p1510:revLst>
+    <p1510:client id="{42BFA742-E52E-4A9D-B420-CD3CB220DF0C}" v="2" dt="2021-05-20T21:06:24.926"/>
+  </p1510:revLst>
+</p1510:revInfo>
+</file>
+
+<file path=ppt/changesInfos/changesInfo1.xml><?xml version="1.0" encoding="utf-8"?>
+<pc:chgInfo xmlns:a="http://schemas.openxmlformats.org/drawingml/2006/main" xmlns:r="http://schemas.openxmlformats.org/officeDocument/2006/relationships" xmlns:ac="http://schemas.microsoft.com/office/drawing/2013/main/command" xmlns:pc="http://schemas.microsoft.com/office/powerpoint/2013/main/command">
+  <pc:docChgLst>
+    <pc:chgData name="Jason Rau" userId="3f9f9555ce112f2c" providerId="LiveId" clId="{42BFA742-E52E-4A9D-B420-CD3CB220DF0C}"/>
+    <pc:docChg chg="undo custSel modSld">
+      <pc:chgData name="Jason Rau" userId="3f9f9555ce112f2c" providerId="LiveId" clId="{42BFA742-E52E-4A9D-B420-CD3CB220DF0C}" dt="2021-05-20T21:28:39.539" v="752" actId="20577"/>
+      <pc:docMkLst>
+        <pc:docMk/>
+      </pc:docMkLst>
+      <pc:sldChg chg="addSp delSp modSp mod">
+        <pc:chgData name="Jason Rau" userId="3f9f9555ce112f2c" providerId="LiveId" clId="{42BFA742-E52E-4A9D-B420-CD3CB220DF0C}" dt="2021-05-20T21:28:39.539" v="752" actId="20577"/>
+        <pc:sldMkLst>
+          <pc:docMk/>
+          <pc:sldMk cId="2932172237" sldId="256"/>
+        </pc:sldMkLst>
+        <pc:spChg chg="mod">
+          <ac:chgData name="Jason Rau" userId="3f9f9555ce112f2c" providerId="LiveId" clId="{42BFA742-E52E-4A9D-B420-CD3CB220DF0C}" dt="2021-05-20T21:06:00.342" v="10" actId="1076"/>
+          <ac:spMkLst>
+            <pc:docMk/>
+            <pc:sldMk cId="2932172237" sldId="256"/>
+            <ac:spMk id="12" creationId="{445E8D33-1B12-4394-818A-C383694A90C7}"/>
+          </ac:spMkLst>
+        </pc:spChg>
+        <pc:spChg chg="mod">
+          <ac:chgData name="Jason Rau" userId="3f9f9555ce112f2c" providerId="LiveId" clId="{42BFA742-E52E-4A9D-B420-CD3CB220DF0C}" dt="2021-05-20T21:08:30.515" v="44" actId="20577"/>
+          <ac:spMkLst>
+            <pc:docMk/>
+            <pc:sldMk cId="2932172237" sldId="256"/>
+            <ac:spMk id="15" creationId="{E5C5A488-1288-4D98-A0BC-1B15700463B2}"/>
+          </ac:spMkLst>
+        </pc:spChg>
+        <pc:spChg chg="del">
+          <ac:chgData name="Jason Rau" userId="3f9f9555ce112f2c" providerId="LiveId" clId="{42BFA742-E52E-4A9D-B420-CD3CB220DF0C}" dt="2021-05-20T21:04:37.497" v="0" actId="478"/>
+          <ac:spMkLst>
+            <pc:docMk/>
+            <pc:sldMk cId="2932172237" sldId="256"/>
+            <ac:spMk id="16" creationId="{6BAAEECB-B76D-4FCB-B3D2-0D03E0B177C9}"/>
+          </ac:spMkLst>
+        </pc:spChg>
+        <pc:spChg chg="del mod">
+          <ac:chgData name="Jason Rau" userId="3f9f9555ce112f2c" providerId="LiveId" clId="{42BFA742-E52E-4A9D-B420-CD3CB220DF0C}" dt="2021-05-20T21:05:11.349" v="4"/>
+          <ac:spMkLst>
+            <pc:docMk/>
+            <pc:sldMk cId="2932172237" sldId="256"/>
+            <ac:spMk id="17" creationId="{EE9BEE44-85BD-4A95-BEC0-DA76D57305D6}"/>
+          </ac:spMkLst>
+        </pc:spChg>
+        <pc:spChg chg="add mod">
+          <ac:chgData name="Jason Rau" userId="3f9f9555ce112f2c" providerId="LiveId" clId="{42BFA742-E52E-4A9D-B420-CD3CB220DF0C}" dt="2021-05-20T21:06:56.688" v="14" actId="1076"/>
+          <ac:spMkLst>
+            <pc:docMk/>
+            <pc:sldMk cId="2932172237" sldId="256"/>
+            <ac:spMk id="18" creationId="{5567823E-6624-47D1-B030-DF138DDB3AF5}"/>
+          </ac:spMkLst>
+        </pc:spChg>
+        <pc:spChg chg="add del mod">
+          <ac:chgData name="Jason Rau" userId="3f9f9555ce112f2c" providerId="LiveId" clId="{42BFA742-E52E-4A9D-B420-CD3CB220DF0C}" dt="2021-05-20T21:26:18.155" v="561" actId="20577"/>
+          <ac:spMkLst>
+            <pc:docMk/>
+            <pc:sldMk cId="2932172237" sldId="256"/>
+            <ac:spMk id="19" creationId="{F8478CBD-C05A-45F6-881B-4B5ACB6A9AD1}"/>
+          </ac:spMkLst>
+        </pc:spChg>
+        <pc:spChg chg="add mod">
+          <ac:chgData name="Jason Rau" userId="3f9f9555ce112f2c" providerId="LiveId" clId="{42BFA742-E52E-4A9D-B420-CD3CB220DF0C}" dt="2021-05-20T21:28:39.539" v="752" actId="20577"/>
+          <ac:spMkLst>
+            <pc:docMk/>
+            <pc:sldMk cId="2932172237" sldId="256"/>
+            <ac:spMk id="20" creationId="{B2E07DA5-4843-43F3-8A2F-26BD9A2648B4}"/>
+          </ac:spMkLst>
+        </pc:spChg>
+        <pc:spChg chg="add mod">
+          <ac:chgData name="Jason Rau" userId="3f9f9555ce112f2c" providerId="LiveId" clId="{42BFA742-E52E-4A9D-B420-CD3CB220DF0C}" dt="2021-05-20T21:11:03.092" v="187" actId="20577"/>
+          <ac:spMkLst>
+            <pc:docMk/>
+            <pc:sldMk cId="2932172237" sldId="256"/>
+            <ac:spMk id="21" creationId="{02EFB6EE-A19E-4DA0-ACC7-89F0EFBD0490}"/>
+          </ac:spMkLst>
+        </pc:spChg>
+        <pc:spChg chg="add mod">
+          <ac:chgData name="Jason Rau" userId="3f9f9555ce112f2c" providerId="LiveId" clId="{42BFA742-E52E-4A9D-B420-CD3CB220DF0C}" dt="2021-05-20T21:08:15.155" v="41" actId="20577"/>
+          <ac:spMkLst>
+            <pc:docMk/>
+            <pc:sldMk cId="2932172237" sldId="256"/>
+            <ac:spMk id="22" creationId="{A2F71339-8CE0-47FA-B0ED-FB84C0D44313}"/>
+          </ac:spMkLst>
+        </pc:spChg>
+        <pc:spChg chg="add mod">
+          <ac:chgData name="Jason Rau" userId="3f9f9555ce112f2c" providerId="LiveId" clId="{42BFA742-E52E-4A9D-B420-CD3CB220DF0C}" dt="2021-05-20T21:09:00.128" v="56" actId="20577"/>
+          <ac:spMkLst>
+            <pc:docMk/>
+            <pc:sldMk cId="2932172237" sldId="256"/>
+            <ac:spMk id="23" creationId="{410314E8-0554-4D41-B8AA-DBACBE13ABDD}"/>
+          </ac:spMkLst>
+        </pc:spChg>
+        <pc:spChg chg="add mod">
+          <ac:chgData name="Jason Rau" userId="3f9f9555ce112f2c" providerId="LiveId" clId="{42BFA742-E52E-4A9D-B420-CD3CB220DF0C}" dt="2021-05-20T21:07:14.685" v="24" actId="20577"/>
+          <ac:spMkLst>
+            <pc:docMk/>
+            <pc:sldMk cId="2932172237" sldId="256"/>
+            <ac:spMk id="24" creationId="{EDE0E493-03A3-4517-AFA4-F943EF02B157}"/>
+          </ac:spMkLst>
+        </pc:spChg>
+      </pc:sldChg>
+    </pc:docChg>
+  </pc:docChgLst>
+</pc:chgInfo>
 </file>
 
 <file path=ppt/notesMasters/notesMaster1.xml><?xml version="1.0" encoding="utf-8"?>
@@ -3894,43 +4011,7 @@
                 <a:latin typeface="Cambria" panose="02040503050406030204" pitchFamily="18" charset="0"/>
                 <a:ea typeface="Cambria" panose="02040503050406030204" pitchFamily="18" charset="0"/>
               </a:rPr>
-              <a:t>Made by: </a:t>
-            </a:r>
-            <a:r>
-              <a:rPr lang="en-US" sz="1400" b="0" cap="none" spc="0" dirty="0" err="1">
-                <a:ln w="0"/>
-                <a:solidFill>
-                  <a:schemeClr val="tx1"/>
-                </a:solidFill>
-                <a:effectLst>
-                  <a:outerShdw blurRad="38100" dist="19050" dir="2700000" algn="tl" rotWithShape="0">
-                    <a:schemeClr val="dk1">
-                      <a:alpha val="40000"/>
-                    </a:schemeClr>
-                  </a:outerShdw>
-                </a:effectLst>
-                <a:latin typeface="Cambria" panose="02040503050406030204" pitchFamily="18" charset="0"/>
-                <a:ea typeface="Cambria" panose="02040503050406030204" pitchFamily="18" charset="0"/>
-              </a:rPr>
-              <a:t>Seongrok</a:t>
-            </a:r>
-            <a:r>
-              <a:rPr lang="en-US" sz="1400" b="0" cap="none" spc="0" dirty="0">
-                <a:ln w="0"/>
-                <a:solidFill>
-                  <a:schemeClr val="tx1"/>
-                </a:solidFill>
-                <a:effectLst>
-                  <a:outerShdw blurRad="38100" dist="19050" dir="2700000" algn="tl" rotWithShape="0">
-                    <a:schemeClr val="dk1">
-                      <a:alpha val="40000"/>
-                    </a:schemeClr>
-                  </a:outerShdw>
-                </a:effectLst>
-                <a:latin typeface="Cambria" panose="02040503050406030204" pitchFamily="18" charset="0"/>
-                <a:ea typeface="Cambria" panose="02040503050406030204" pitchFamily="18" charset="0"/>
-              </a:rPr>
-              <a:t> Shin</a:t>
+              <a:t>Made by: Seongrok Shin</a:t>
             </a:r>
           </a:p>
         </p:txBody>
@@ -4685,20 +4766,84 @@
       </p:sp>
       <p:sp>
         <p:nvSpPr>
-          <p:cNvPr id="16" name="TextBox 15">
-            <a:extLst>
-              <a:ext uri="{FF2B5EF4-FFF2-40B4-BE49-F238E27FC236}">
-                <a16:creationId xmlns:a16="http://schemas.microsoft.com/office/drawing/2014/main" id="{6BAAEECB-B76D-4FCB-B3D2-0D03E0B177C9}"/>
-              </a:ext>
-            </a:extLst>
-          </p:cNvPr>
-          <p:cNvSpPr txBox="1"/>
+          <p:cNvPr id="18" name="Rectangle 17">
+            <a:extLst>
+              <a:ext uri="{FF2B5EF4-FFF2-40B4-BE49-F238E27FC236}">
+                <a16:creationId xmlns:a16="http://schemas.microsoft.com/office/drawing/2014/main" id="{5567823E-6624-47D1-B030-DF138DDB3AF5}"/>
+              </a:ext>
+            </a:extLst>
+          </p:cNvPr>
+          <p:cNvSpPr/>
           <p:nvPr/>
         </p:nvSpPr>
         <p:spPr>
           <a:xfrm>
-            <a:off x="347425" y="2455774"/>
-            <a:ext cx="3247646" cy="1200329"/>
+            <a:off x="2184108" y="1508710"/>
+            <a:ext cx="317758" cy="3160285"/>
+          </a:xfrm>
+          <a:prstGeom prst="rect">
+            <a:avLst/>
+          </a:prstGeom>
+          <a:gradFill flip="none" rotWithShape="1">
+            <a:gsLst>
+              <a:gs pos="34000">
+                <a:srgbClr val="FFFFFF"/>
+              </a:gs>
+              <a:gs pos="50000">
+                <a:schemeClr val="tx1"/>
+              </a:gs>
+              <a:gs pos="66000">
+                <a:srgbClr val="FFFFFF"/>
+              </a:gs>
+            </a:gsLst>
+            <a:lin ang="10800000" scaled="1"/>
+            <a:tileRect/>
+          </a:gradFill>
+          <a:ln>
+            <a:noFill/>
+          </a:ln>
+        </p:spPr>
+        <p:style>
+          <a:lnRef idx="2">
+            <a:schemeClr val="accent1">
+              <a:shade val="50000"/>
+            </a:schemeClr>
+          </a:lnRef>
+          <a:fillRef idx="1">
+            <a:schemeClr val="accent1"/>
+          </a:fillRef>
+          <a:effectRef idx="0">
+            <a:schemeClr val="accent1"/>
+          </a:effectRef>
+          <a:fontRef idx="minor">
+            <a:schemeClr val="lt1"/>
+          </a:fontRef>
+        </p:style>
+        <p:txBody>
+          <a:bodyPr rtlCol="0" anchor="ctr"/>
+          <a:lstStyle/>
+          <a:p>
+            <a:pPr algn="ctr"/>
+            <a:endParaRPr lang="en-NZ"/>
+          </a:p>
+        </p:txBody>
+      </p:sp>
+      <p:sp>
+        <p:nvSpPr>
+          <p:cNvPr id="19" name="Rectangle 18">
+            <a:extLst>
+              <a:ext uri="{FF2B5EF4-FFF2-40B4-BE49-F238E27FC236}">
+                <a16:creationId xmlns:a16="http://schemas.microsoft.com/office/drawing/2014/main" id="{F8478CBD-C05A-45F6-881B-4B5ACB6A9AD1}"/>
+              </a:ext>
+            </a:extLst>
+          </p:cNvPr>
+          <p:cNvSpPr/>
+          <p:nvPr/>
+        </p:nvSpPr>
+        <p:spPr>
+          <a:xfrm>
+            <a:off x="2388554" y="1338828"/>
+            <a:ext cx="3669760" cy="923330"/>
           </a:xfrm>
           <a:prstGeom prst="rect">
             <a:avLst/>
@@ -4706,30 +4851,51 @@
           <a:noFill/>
         </p:spPr>
         <p:txBody>
-          <a:bodyPr wrap="square">
+          <a:bodyPr wrap="square" lIns="91440" tIns="45720" rIns="91440" bIns="45720">
             <a:spAutoFit/>
           </a:bodyPr>
           <a:lstStyle/>
           <a:p>
-            <a:r>
-              <a:rPr lang="en-NZ" dirty="0">
-                <a:hlinkClick r:id="rId3"/>
+            <a:pPr algn="ctr"/>
+            <a:r>
+              <a:rPr lang="en-US" dirty="0">
+                <a:ln w="0"/>
+                <a:effectLst>
+                  <a:outerShdw blurRad="38100" dist="19050" dir="2700000" algn="tl" rotWithShape="0">
+                    <a:schemeClr val="dk1">
+                      <a:alpha val="40000"/>
+                    </a:schemeClr>
+                  </a:outerShdw>
+                </a:effectLst>
+                <a:latin typeface="Cambria" panose="02040503050406030204" pitchFamily="18" charset="0"/>
+                <a:ea typeface="Cambria" panose="02040503050406030204" pitchFamily="18" charset="0"/>
               </a:rPr>
-              <a:t>https://arstechnica.com/gadgets/2021/05/96-of-us-users-opt-out-of-app-tracking-in-ios-14-5-analytics-find/</a:t>
-            </a:r>
-            <a:r>
-              <a:rPr lang="en-NZ" dirty="0"/>
-              <a:t> </a:t>
-            </a:r>
-          </a:p>
-        </p:txBody>
-      </p:sp>
-      <p:sp>
-        <p:nvSpPr>
-          <p:cNvPr id="17" name="Rectangle 16">
-            <a:extLst>
-              <a:ext uri="{FF2B5EF4-FFF2-40B4-BE49-F238E27FC236}">
-                <a16:creationId xmlns:a16="http://schemas.microsoft.com/office/drawing/2014/main" id="{EE9BEE44-85BD-4A95-BEC0-DA76D57305D6}"/>
+              <a:t>Most social media apps track your phone, such as what you search and look at and give relative adds</a:t>
+            </a:r>
+            <a:endParaRPr lang="en-US" b="0" cap="none" spc="0" dirty="0">
+              <a:ln w="0"/>
+              <a:solidFill>
+                <a:schemeClr val="tx1"/>
+              </a:solidFill>
+              <a:effectLst>
+                <a:outerShdw blurRad="38100" dist="19050" dir="2700000" algn="tl" rotWithShape="0">
+                  <a:schemeClr val="dk1">
+                    <a:alpha val="40000"/>
+                  </a:schemeClr>
+                </a:outerShdw>
+              </a:effectLst>
+              <a:latin typeface="Cambria" panose="02040503050406030204" pitchFamily="18" charset="0"/>
+              <a:ea typeface="Cambria" panose="02040503050406030204" pitchFamily="18" charset="0"/>
+            </a:endParaRPr>
+          </a:p>
+        </p:txBody>
+      </p:sp>
+      <p:sp>
+        <p:nvSpPr>
+          <p:cNvPr id="20" name="Rectangle 19">
+            <a:extLst>
+              <a:ext uri="{FF2B5EF4-FFF2-40B4-BE49-F238E27FC236}">
+                <a16:creationId xmlns:a16="http://schemas.microsoft.com/office/drawing/2014/main" id="{B2E07DA5-4843-43F3-8A2F-26BD9A2648B4}"/>
               </a:ext>
             </a:extLst>
           </p:cNvPr>
@@ -4738,8 +4904,8 @@
         </p:nvSpPr>
         <p:spPr>
           <a:xfrm>
-            <a:off x="41044" y="1035447"/>
-            <a:ext cx="3554027" cy="1323439"/>
+            <a:off x="2348802" y="2588496"/>
+            <a:ext cx="3669760" cy="923330"/>
           </a:xfrm>
           <a:prstGeom prst="rect">
             <a:avLst/>
@@ -4754,7 +4920,7 @@
           <a:p>
             <a:pPr algn="ctr"/>
             <a:r>
-              <a:rPr lang="en-US" sz="2000" b="0" cap="none" spc="0" dirty="0">
+              <a:rPr lang="en-US" b="0" cap="none" spc="0" dirty="0">
                 <a:ln w="0"/>
                 <a:solidFill>
                   <a:schemeClr val="tx1"/>
@@ -4766,14 +4932,13 @@
                     </a:schemeClr>
                   </a:outerShdw>
                 </a:effectLst>
+                <a:latin typeface="Cambria" panose="02040503050406030204" pitchFamily="18" charset="0"/>
+                <a:ea typeface="Cambria" panose="02040503050406030204" pitchFamily="18" charset="0"/>
               </a:rPr>
-              <a:t>Jason, check out this article… it might be a good one to reference</a:t>
-            </a:r>
-          </a:p>
-          <a:p>
-            <a:pPr algn="ctr"/>
-            <a:r>
-              <a:rPr lang="en-US" sz="2000" dirty="0">
+              <a:t>Some compan</a:t>
+            </a:r>
+            <a:r>
+              <a:rPr lang="en-US" dirty="0">
                 <a:ln w="0"/>
                 <a:effectLst>
                   <a:outerShdw blurRad="38100" dist="19050" dir="2700000" algn="tl" rotWithShape="0">
@@ -4782,10 +4947,27 @@
                     </a:schemeClr>
                   </a:outerShdw>
                 </a:effectLst>
+                <a:latin typeface="Cambria" panose="02040503050406030204" pitchFamily="18" charset="0"/>
+                <a:ea typeface="Cambria" panose="02040503050406030204" pitchFamily="18" charset="0"/>
               </a:rPr>
-              <a:t>-Charlie</a:t>
-            </a:r>
-            <a:endParaRPr lang="en-US" sz="2000" b="0" cap="none" spc="0" dirty="0">
+              <a:t>ies have been losing money due to workers productivity loss from using social media </a:t>
+            </a:r>
+            <a:r>
+              <a:rPr lang="en-US" dirty="0" err="1">
+                <a:ln w="0"/>
+                <a:effectLst>
+                  <a:outerShdw blurRad="38100" dist="19050" dir="2700000" algn="tl" rotWithShape="0">
+                    <a:schemeClr val="dk1">
+                      <a:alpha val="40000"/>
+                    </a:schemeClr>
+                  </a:outerShdw>
+                </a:effectLst>
+                <a:latin typeface="Cambria" panose="02040503050406030204" pitchFamily="18" charset="0"/>
+                <a:ea typeface="Cambria" panose="02040503050406030204" pitchFamily="18" charset="0"/>
+              </a:rPr>
+              <a:t>apss</a:t>
+            </a:r>
+            <a:endParaRPr lang="en-US" b="0" cap="none" spc="0" dirty="0">
               <a:ln w="0"/>
               <a:solidFill>
                 <a:schemeClr val="tx1"/>
@@ -4797,7 +4979,209 @@
                   </a:schemeClr>
                 </a:outerShdw>
               </a:effectLst>
+              <a:latin typeface="Cambria" panose="02040503050406030204" pitchFamily="18" charset="0"/>
+              <a:ea typeface="Cambria" panose="02040503050406030204" pitchFamily="18" charset="0"/>
             </a:endParaRPr>
+          </a:p>
+        </p:txBody>
+      </p:sp>
+      <p:sp>
+        <p:nvSpPr>
+          <p:cNvPr id="21" name="Rectangle 20">
+            <a:extLst>
+              <a:ext uri="{FF2B5EF4-FFF2-40B4-BE49-F238E27FC236}">
+                <a16:creationId xmlns:a16="http://schemas.microsoft.com/office/drawing/2014/main" id="{02EFB6EE-A19E-4DA0-ACC7-89F0EFBD0490}"/>
+              </a:ext>
+            </a:extLst>
+          </p:cNvPr>
+          <p:cNvSpPr/>
+          <p:nvPr/>
+        </p:nvSpPr>
+        <p:spPr>
+          <a:xfrm>
+            <a:off x="2366198" y="3883623"/>
+            <a:ext cx="3669760" cy="923330"/>
+          </a:xfrm>
+          <a:prstGeom prst="rect">
+            <a:avLst/>
+          </a:prstGeom>
+          <a:noFill/>
+        </p:spPr>
+        <p:txBody>
+          <a:bodyPr wrap="square" lIns="91440" tIns="45720" rIns="91440" bIns="45720">
+            <a:spAutoFit/>
+          </a:bodyPr>
+          <a:lstStyle/>
+          <a:p>
+            <a:pPr algn="ctr"/>
+            <a:r>
+              <a:rPr lang="en-US" b="0" cap="none" spc="0" dirty="0">
+                <a:ln w="0"/>
+                <a:solidFill>
+                  <a:schemeClr val="tx1"/>
+                </a:solidFill>
+                <a:effectLst>
+                  <a:outerShdw blurRad="38100" dist="19050" dir="2700000" algn="tl" rotWithShape="0">
+                    <a:schemeClr val="dk1">
+                      <a:alpha val="40000"/>
+                    </a:schemeClr>
+                  </a:outerShdw>
+                </a:effectLst>
+                <a:latin typeface="Cambria" panose="02040503050406030204" pitchFamily="18" charset="0"/>
+                <a:ea typeface="Cambria" panose="02040503050406030204" pitchFamily="18" charset="0"/>
+              </a:rPr>
+              <a:t>Social media platforms taking matters into their own hands to be judge, jury, and executioner</a:t>
+            </a:r>
+          </a:p>
+        </p:txBody>
+      </p:sp>
+      <p:sp>
+        <p:nvSpPr>
+          <p:cNvPr id="22" name="Rectangle 21">
+            <a:extLst>
+              <a:ext uri="{FF2B5EF4-FFF2-40B4-BE49-F238E27FC236}">
+                <a16:creationId xmlns:a16="http://schemas.microsoft.com/office/drawing/2014/main" id="{A2F71339-8CE0-47FA-B0ED-FB84C0D44313}"/>
+              </a:ext>
+            </a:extLst>
+          </p:cNvPr>
+          <p:cNvSpPr/>
+          <p:nvPr/>
+        </p:nvSpPr>
+        <p:spPr>
+          <a:xfrm>
+            <a:off x="38183" y="2896878"/>
+            <a:ext cx="2220699" cy="369332"/>
+          </a:xfrm>
+          <a:prstGeom prst="rect">
+            <a:avLst/>
+          </a:prstGeom>
+          <a:noFill/>
+        </p:spPr>
+        <p:txBody>
+          <a:bodyPr wrap="square" lIns="91440" tIns="45720" rIns="91440" bIns="45720">
+            <a:spAutoFit/>
+          </a:bodyPr>
+          <a:lstStyle/>
+          <a:p>
+            <a:pPr algn="ctr"/>
+            <a:r>
+              <a:rPr lang="en-US" b="0" cap="none" spc="0" dirty="0">
+                <a:ln w="0"/>
+                <a:solidFill>
+                  <a:schemeClr val="tx1"/>
+                </a:solidFill>
+                <a:effectLst>
+                  <a:outerShdw blurRad="38100" dist="19050" dir="2700000" algn="tl" rotWithShape="0">
+                    <a:schemeClr val="dk1">
+                      <a:alpha val="40000"/>
+                    </a:schemeClr>
+                  </a:outerShdw>
+                </a:effectLst>
+                <a:latin typeface="Cambria" panose="02040503050406030204" pitchFamily="18" charset="0"/>
+                <a:ea typeface="Cambria" panose="02040503050406030204" pitchFamily="18" charset="0"/>
+              </a:rPr>
+              <a:t>Productivity Loss</a:t>
+            </a:r>
+          </a:p>
+        </p:txBody>
+      </p:sp>
+      <p:sp>
+        <p:nvSpPr>
+          <p:cNvPr id="23" name="Rectangle 22">
+            <a:extLst>
+              <a:ext uri="{FF2B5EF4-FFF2-40B4-BE49-F238E27FC236}">
+                <a16:creationId xmlns:a16="http://schemas.microsoft.com/office/drawing/2014/main" id="{410314E8-0554-4D41-B8AA-DBACBE13ABDD}"/>
+              </a:ext>
+            </a:extLst>
+          </p:cNvPr>
+          <p:cNvSpPr/>
+          <p:nvPr/>
+        </p:nvSpPr>
+        <p:spPr>
+          <a:xfrm>
+            <a:off x="29945" y="4172930"/>
+            <a:ext cx="2220698" cy="369332"/>
+          </a:xfrm>
+          <a:prstGeom prst="rect">
+            <a:avLst/>
+          </a:prstGeom>
+          <a:noFill/>
+        </p:spPr>
+        <p:txBody>
+          <a:bodyPr wrap="square" lIns="91440" tIns="45720" rIns="91440" bIns="45720">
+            <a:spAutoFit/>
+          </a:bodyPr>
+          <a:lstStyle/>
+          <a:p>
+            <a:pPr algn="ctr"/>
+            <a:r>
+              <a:rPr lang="en-US" b="0" cap="none" spc="0" dirty="0">
+                <a:ln w="0"/>
+                <a:solidFill>
+                  <a:schemeClr val="tx1"/>
+                </a:solidFill>
+                <a:effectLst>
+                  <a:outerShdw blurRad="38100" dist="19050" dir="2700000" algn="tl" rotWithShape="0">
+                    <a:schemeClr val="dk1">
+                      <a:alpha val="40000"/>
+                    </a:schemeClr>
+                  </a:outerShdw>
+                </a:effectLst>
+                <a:latin typeface="Cambria" panose="02040503050406030204" pitchFamily="18" charset="0"/>
+                <a:ea typeface="Cambria" panose="02040503050406030204" pitchFamily="18" charset="0"/>
+              </a:rPr>
+              <a:t>Vigilantism</a:t>
+            </a:r>
+          </a:p>
+        </p:txBody>
+      </p:sp>
+      <p:sp>
+        <p:nvSpPr>
+          <p:cNvPr id="24" name="Rectangle 23">
+            <a:extLst>
+              <a:ext uri="{FF2B5EF4-FFF2-40B4-BE49-F238E27FC236}">
+                <a16:creationId xmlns:a16="http://schemas.microsoft.com/office/drawing/2014/main" id="{EDE0E493-03A3-4517-AFA4-F943EF02B157}"/>
+              </a:ext>
+            </a:extLst>
+          </p:cNvPr>
+          <p:cNvSpPr/>
+          <p:nvPr/>
+        </p:nvSpPr>
+        <p:spPr>
+          <a:xfrm>
+            <a:off x="38183" y="1620827"/>
+            <a:ext cx="2220699" cy="369332"/>
+          </a:xfrm>
+          <a:prstGeom prst="rect">
+            <a:avLst/>
+          </a:prstGeom>
+          <a:noFill/>
+        </p:spPr>
+        <p:txBody>
+          <a:bodyPr wrap="square" lIns="91440" tIns="45720" rIns="91440" bIns="45720">
+            <a:spAutoFit/>
+          </a:bodyPr>
+          <a:lstStyle/>
+          <a:p>
+            <a:pPr algn="ctr"/>
+            <a:r>
+              <a:rPr lang="en-US" b="0" cap="none" spc="0" dirty="0">
+                <a:ln w="0"/>
+                <a:solidFill>
+                  <a:schemeClr val="tx1"/>
+                </a:solidFill>
+                <a:effectLst>
+                  <a:outerShdw blurRad="38100" dist="19050" dir="2700000" algn="tl" rotWithShape="0">
+                    <a:schemeClr val="dk1">
+                      <a:alpha val="40000"/>
+                    </a:schemeClr>
+                  </a:outerShdw>
+                </a:effectLst>
+                <a:latin typeface="Cambria" panose="02040503050406030204" pitchFamily="18" charset="0"/>
+                <a:ea typeface="Cambria" panose="02040503050406030204" pitchFamily="18" charset="0"/>
+              </a:rPr>
+              <a:t>Privacy</a:t>
+            </a:r>
           </a:p>
         </p:txBody>
       </p:sp>

</xml_diff>